<commit_message>
fixing jre and slides
</commit_message>
<xml_diff>
--- a/ClassMaterials/2DArraysAndMaps/Slides/2D Arrays and Maps.pptx
+++ b/ClassMaterials/2DArraysAndMaps/Slides/2D Arrays and Maps.pptx
@@ -25,29 +25,29 @@
     <p:sldId id="273" r:id="rId13"/>
     <p:sldId id="259" r:id="rId14"/>
     <p:sldId id="261" r:id="rId15"/>
-    <p:sldId id="257" r:id="rId16"/>
-    <p:sldId id="274" r:id="rId17"/>
-    <p:sldId id="275" r:id="rId18"/>
-    <p:sldId id="276" r:id="rId19"/>
-    <p:sldId id="277" r:id="rId20"/>
-    <p:sldId id="278" r:id="rId21"/>
-    <p:sldId id="279" r:id="rId22"/>
-    <p:sldId id="280" r:id="rId23"/>
-    <p:sldId id="281" r:id="rId24"/>
-    <p:sldId id="282" r:id="rId25"/>
-    <p:sldId id="283" r:id="rId26"/>
-    <p:sldId id="284" r:id="rId27"/>
-    <p:sldId id="285" r:id="rId28"/>
-    <p:sldId id="286" r:id="rId29"/>
-    <p:sldId id="287" r:id="rId30"/>
-    <p:sldId id="288" r:id="rId31"/>
-    <p:sldId id="289" r:id="rId32"/>
-    <p:sldId id="290" r:id="rId33"/>
-    <p:sldId id="291" r:id="rId34"/>
-    <p:sldId id="292" r:id="rId35"/>
-    <p:sldId id="293" r:id="rId36"/>
-    <p:sldId id="294" r:id="rId37"/>
-    <p:sldId id="299" r:id="rId38"/>
+    <p:sldId id="274" r:id="rId16"/>
+    <p:sldId id="275" r:id="rId17"/>
+    <p:sldId id="276" r:id="rId18"/>
+    <p:sldId id="277" r:id="rId19"/>
+    <p:sldId id="278" r:id="rId20"/>
+    <p:sldId id="279" r:id="rId21"/>
+    <p:sldId id="280" r:id="rId22"/>
+    <p:sldId id="281" r:id="rId23"/>
+    <p:sldId id="282" r:id="rId24"/>
+    <p:sldId id="283" r:id="rId25"/>
+    <p:sldId id="284" r:id="rId26"/>
+    <p:sldId id="285" r:id="rId27"/>
+    <p:sldId id="286" r:id="rId28"/>
+    <p:sldId id="287" r:id="rId29"/>
+    <p:sldId id="288" r:id="rId30"/>
+    <p:sldId id="289" r:id="rId31"/>
+    <p:sldId id="290" r:id="rId32"/>
+    <p:sldId id="291" r:id="rId33"/>
+    <p:sldId id="292" r:id="rId34"/>
+    <p:sldId id="293" r:id="rId35"/>
+    <p:sldId id="294" r:id="rId36"/>
+    <p:sldId id="299" r:id="rId37"/>
+    <p:sldId id="257" r:id="rId38"/>
     <p:sldId id="260" r:id="rId39"/>
     <p:sldId id="263" r:id="rId40"/>
     <p:sldId id="264" r:id="rId41"/>
@@ -330,7 +330,7 @@
               <a:pPr>
                 <a:defRPr/>
               </a:pPr>
-              <a:t>2/28/2020</a:t>
+              <a:t>3/11/2020</a:t>
             </a:fld>
             <a:endParaRPr lang="en-US"/>
           </a:p>
@@ -565,7 +565,7 @@
               <a:pPr>
                 <a:defRPr/>
               </a:pPr>
-              <a:t>2/28/2020</a:t>
+              <a:t>3/11/2020</a:t>
             </a:fld>
             <a:endParaRPr lang="en-US"/>
           </a:p>
@@ -997,11 +997,7 @@
             </a:pPr>
             <a:r>
               <a:rPr lang="en-US" dirty="0" smtClean="0"/>
-              <a:t>Bring </a:t>
-            </a:r>
-            <a:r>
-              <a:rPr lang="en-US" dirty="0" smtClean="0"/>
-              <a:t>hard copy of code from 2DArraysAndMapsS</a:t>
+              <a:t>Bring hard copy of code from 2DArraysAndMapsS</a:t>
             </a:r>
             <a:r>
               <a:rPr lang="en-US" baseline="0" dirty="0" smtClean="0"/>
@@ -1427,7 +1423,7 @@
               <a:pPr>
                 <a:defRPr/>
               </a:pPr>
-              <a:t>15</a:t>
+              <a:t>37</a:t>
             </a:fld>
             <a:endParaRPr lang="en-US"/>
           </a:p>
@@ -3352,7 +3348,7 @@
               <a:pPr>
                 <a:defRPr/>
               </a:pPr>
-              <a:t>Friday, February 28, 2020</a:t>
+              <a:t>Wednesday, March 11, 2020</a:t>
             </a:fld>
             <a:endParaRPr lang="en-US" dirty="0"/>
           </a:p>
@@ -3535,7 +3531,7 @@
               <a:pPr>
                 <a:defRPr/>
               </a:pPr>
-              <a:t>Friday, February 28, 2020</a:t>
+              <a:t>Wednesday, March 11, 2020</a:t>
             </a:fld>
             <a:endParaRPr lang="en-US" dirty="0"/>
           </a:p>
@@ -3728,7 +3724,7 @@
               <a:pPr>
                 <a:defRPr/>
               </a:pPr>
-              <a:t>Friday, February 28, 2020</a:t>
+              <a:t>Wednesday, March 11, 2020</a:t>
             </a:fld>
             <a:endParaRPr lang="en-US" dirty="0"/>
           </a:p>
@@ -3911,7 +3907,7 @@
               <a:pPr>
                 <a:defRPr/>
               </a:pPr>
-              <a:t>Friday, February 28, 2020</a:t>
+              <a:t>Wednesday, March 11, 2020</a:t>
             </a:fld>
             <a:endParaRPr lang="en-US" dirty="0"/>
           </a:p>
@@ -4171,7 +4167,7 @@
               <a:pPr>
                 <a:defRPr/>
               </a:pPr>
-              <a:t>Friday, February 28, 2020</a:t>
+              <a:t>Wednesday, March 11, 2020</a:t>
             </a:fld>
             <a:endParaRPr lang="en-US"/>
           </a:p>
@@ -4471,7 +4467,7 @@
               <a:pPr>
                 <a:defRPr/>
               </a:pPr>
-              <a:t>Friday, February 28, 2020</a:t>
+              <a:t>Wednesday, March 11, 2020</a:t>
             </a:fld>
             <a:endParaRPr lang="en-US"/>
           </a:p>
@@ -4905,7 +4901,7 @@
               <a:pPr>
                 <a:defRPr/>
               </a:pPr>
-              <a:t>Friday, February 28, 2020</a:t>
+              <a:t>Wednesday, March 11, 2020</a:t>
             </a:fld>
             <a:endParaRPr lang="en-US"/>
           </a:p>
@@ -5037,7 +5033,7 @@
               <a:pPr>
                 <a:defRPr/>
               </a:pPr>
-              <a:t>Friday, February 28, 2020</a:t>
+              <a:t>Wednesday, March 11, 2020</a:t>
             </a:fld>
             <a:endParaRPr lang="en-US"/>
           </a:p>
@@ -5147,7 +5143,7 @@
               <a:pPr>
                 <a:defRPr/>
               </a:pPr>
-              <a:t>Friday, February 28, 2020</a:t>
+              <a:t>Wednesday, March 11, 2020</a:t>
             </a:fld>
             <a:endParaRPr lang="en-US" dirty="0"/>
           </a:p>
@@ -5437,7 +5433,7 @@
               <a:pPr>
                 <a:defRPr/>
               </a:pPr>
-              <a:t>Friday, February 28, 2020</a:t>
+              <a:t>Wednesday, March 11, 2020</a:t>
             </a:fld>
             <a:endParaRPr lang="en-US"/>
           </a:p>
@@ -5704,7 +5700,7 @@
               <a:pPr>
                 <a:defRPr/>
               </a:pPr>
-              <a:t>Friday, February 28, 2020</a:t>
+              <a:t>Wednesday, March 11, 2020</a:t>
             </a:fld>
             <a:endParaRPr lang="en-US"/>
           </a:p>
@@ -5930,7 +5926,7 @@
               <a:pPr>
                 <a:defRPr/>
               </a:pPr>
-              <a:t>Friday, February 28, 2020</a:t>
+              <a:t>Wednesday, March 11, 2020</a:t>
             </a:fld>
             <a:endParaRPr lang="en-US" dirty="0"/>
           </a:p>
@@ -7225,7 +7221,7 @@
             <a:effectLst/>
             <a:extLst>
               <a:ext uri="{C572A759-6A51-4108-AA02-DFA0A04FC94B}">
-                <ma14:wrappingTextBoxFlag xmlns="" xmlns:ma14="http://schemas.microsoft.com/office/mac/drawingml/2011/main" val="1"/>
+                <ma14:wrappingTextBoxFlag xmlns:ma14="http://schemas.microsoft.com/office/mac/drawingml/2011/main" xmlns="" val="1"/>
               </a:ext>
             </a:extLst>
           </p:spPr>
@@ -7445,7 +7441,7 @@
             <a:effectLst/>
             <a:extLst>
               <a:ext uri="{C572A759-6A51-4108-AA02-DFA0A04FC94B}">
-                <ma14:wrappingTextBoxFlag xmlns="" xmlns:ma14="http://schemas.microsoft.com/office/mac/drawingml/2011/main" val="1"/>
+                <ma14:wrappingTextBoxFlag xmlns:ma14="http://schemas.microsoft.com/office/mac/drawingml/2011/main" xmlns="" val="1"/>
               </a:ext>
             </a:extLst>
           </p:spPr>
@@ -8184,106 +8180,6 @@
           <a:p>
             <a:r>
               <a:rPr lang="en-US" dirty="0"/>
-              <a:t>2D Arrays</a:t>
-            </a:r>
-          </a:p>
-        </p:txBody>
-      </p:sp>
-      <p:sp>
-        <p:nvSpPr>
-          <p:cNvPr id="3" name="Content Placeholder 2"/>
-          <p:cNvSpPr>
-            <a:spLocks noGrp="1"/>
-          </p:cNvSpPr>
-          <p:nvPr>
-            <p:ph idx="1"/>
-          </p:nvPr>
-        </p:nvSpPr>
-        <p:spPr/>
-        <p:txBody>
-          <a:bodyPr>
-            <a:normAutofit lnSpcReduction="10000"/>
-          </a:bodyPr>
-          <a:lstStyle/>
-          <a:p>
-            <a:r>
-              <a:rPr lang="en-US" dirty="0"/>
-              <a:t>Make groups of two (no more than 3, no one can work alone)</a:t>
-            </a:r>
-          </a:p>
-          <a:p>
-            <a:r>
-              <a:rPr lang="en-US" dirty="0"/>
-              <a:t>Read through the 3 2D Array sample problems with your partner and make sure you both understand how they work</a:t>
-            </a:r>
-          </a:p>
-          <a:p>
-            <a:r>
-              <a:rPr lang="en-US" dirty="0"/>
-              <a:t>Then use the code as an example to answer the 2D Array quiz questions</a:t>
-            </a:r>
-          </a:p>
-          <a:p>
-            <a:r>
-              <a:rPr lang="en-US" dirty="0"/>
-              <a:t>Then do the 2d sample problems</a:t>
-            </a:r>
-          </a:p>
-          <a:p>
-            <a:r>
-              <a:rPr lang="en-US" dirty="0"/>
-              <a:t>Call me over when you’re finished</a:t>
-            </a:r>
-          </a:p>
-        </p:txBody>
-      </p:sp>
-    </p:spTree>
-    <p:extLst>
-      <p:ext uri="{BB962C8B-B14F-4D97-AF65-F5344CB8AC3E}">
-        <p14:creationId xmlns:p14="http://schemas.microsoft.com/office/powerpoint/2010/main" val="2522096617"/>
-      </p:ext>
-    </p:extLst>
-  </p:cSld>
-  <p:clrMapOvr>
-    <a:masterClrMapping/>
-  </p:clrMapOvr>
-</p:sld>
-</file>
-
-<file path=ppt/slides/slide16.xml><?xml version="1.0" encoding="utf-8"?>
-<p:sld xmlns:a="http://schemas.openxmlformats.org/drawingml/2006/main" xmlns:r="http://schemas.openxmlformats.org/officeDocument/2006/relationships" xmlns:p="http://schemas.openxmlformats.org/presentationml/2006/main">
-  <p:cSld>
-    <p:spTree>
-      <p:nvGrpSpPr>
-        <p:cNvPr id="1" name=""/>
-        <p:cNvGrpSpPr/>
-        <p:nvPr/>
-      </p:nvGrpSpPr>
-      <p:grpSpPr>
-        <a:xfrm>
-          <a:off x="0" y="0"/>
-          <a:ext cx="0" cy="0"/>
-          <a:chOff x="0" y="0"/>
-          <a:chExt cx="0" cy="0"/>
-        </a:xfrm>
-      </p:grpSpPr>
-      <p:sp>
-        <p:nvSpPr>
-          <p:cNvPr id="2" name="Title 1"/>
-          <p:cNvSpPr>
-            <a:spLocks noGrp="1"/>
-          </p:cNvSpPr>
-          <p:nvPr>
-            <p:ph type="title"/>
-          </p:nvPr>
-        </p:nvSpPr>
-        <p:spPr/>
-        <p:txBody>
-          <a:bodyPr/>
-          <a:lstStyle/>
-          <a:p>
-            <a:r>
-              <a:rPr lang="en-US" dirty="0"/>
               <a:t>Creating a 2D char array</a:t>
             </a:r>
           </a:p>
@@ -8350,7 +8246,7 @@
 </p:sld>
 </file>
 
-<file path=ppt/slides/slide17.xml><?xml version="1.0" encoding="utf-8"?>
+<file path=ppt/slides/slide16.xml><?xml version="1.0" encoding="utf-8"?>
 <p:sld xmlns:a="http://schemas.openxmlformats.org/drawingml/2006/main" xmlns:r="http://schemas.openxmlformats.org/officeDocument/2006/relationships" xmlns:p="http://schemas.openxmlformats.org/presentationml/2006/main">
   <p:cSld>
     <p:spTree>
@@ -8450,7 +8346,7 @@
 </p:sld>
 </file>
 
-<file path=ppt/slides/slide18.xml><?xml version="1.0" encoding="utf-8"?>
+<file path=ppt/slides/slide17.xml><?xml version="1.0" encoding="utf-8"?>
 <p:sld xmlns:a="http://schemas.openxmlformats.org/drawingml/2006/main" xmlns:r="http://schemas.openxmlformats.org/officeDocument/2006/relationships" xmlns:p="http://schemas.openxmlformats.org/presentationml/2006/main">
   <p:cSld>
     <p:spTree>
@@ -8550,7 +8446,7 @@
 </p:sld>
 </file>
 
-<file path=ppt/slides/slide19.xml><?xml version="1.0" encoding="utf-8"?>
+<file path=ppt/slides/slide18.xml><?xml version="1.0" encoding="utf-8"?>
 <p:sld xmlns:a="http://schemas.openxmlformats.org/drawingml/2006/main" xmlns:r="http://schemas.openxmlformats.org/officeDocument/2006/relationships" xmlns:p="http://schemas.openxmlformats.org/presentationml/2006/main">
   <p:cSld>
     <p:spTree>
@@ -8674,6 +8570,119 @@
     <p:extLst>
       <p:ext uri="{BB962C8B-B14F-4D97-AF65-F5344CB8AC3E}">
         <p14:creationId xmlns:p14="http://schemas.microsoft.com/office/powerpoint/2010/main" val="1078238249"/>
+      </p:ext>
+    </p:extLst>
+  </p:cSld>
+  <p:clrMapOvr>
+    <a:masterClrMapping/>
+  </p:clrMapOvr>
+</p:sld>
+</file>
+
+<file path=ppt/slides/slide19.xml><?xml version="1.0" encoding="utf-8"?>
+<p:sld xmlns:a="http://schemas.openxmlformats.org/drawingml/2006/main" xmlns:r="http://schemas.openxmlformats.org/officeDocument/2006/relationships" xmlns:p="http://schemas.openxmlformats.org/presentationml/2006/main">
+  <p:cSld>
+    <p:spTree>
+      <p:nvGrpSpPr>
+        <p:cNvPr id="1" name=""/>
+        <p:cNvGrpSpPr/>
+        <p:nvPr/>
+      </p:nvGrpSpPr>
+      <p:grpSpPr>
+        <a:xfrm>
+          <a:off x="0" y="0"/>
+          <a:ext cx="0" cy="0"/>
+          <a:chOff x="0" y="0"/>
+          <a:chExt cx="0" cy="0"/>
+        </a:xfrm>
+      </p:grpSpPr>
+      <p:sp>
+        <p:nvSpPr>
+          <p:cNvPr id="2" name="Title 1"/>
+          <p:cNvSpPr>
+            <a:spLocks noGrp="1"/>
+          </p:cNvSpPr>
+          <p:nvPr>
+            <p:ph type="title"/>
+          </p:nvPr>
+        </p:nvSpPr>
+        <p:spPr/>
+        <p:txBody>
+          <a:bodyPr/>
+          <a:lstStyle/>
+          <a:p>
+            <a:r>
+              <a:rPr lang="en-US" dirty="0"/>
+              <a:t>Creating a 2D char array</a:t>
+            </a:r>
+          </a:p>
+        </p:txBody>
+      </p:sp>
+      <p:pic>
+        <p:nvPicPr>
+          <p:cNvPr id="3" name="Picture 2"/>
+          <p:cNvPicPr>
+            <a:picLocks noChangeAspect="1"/>
+          </p:cNvPicPr>
+          <p:nvPr/>
+        </p:nvPicPr>
+        <p:blipFill>
+          <a:blip r:embed="rId2"/>
+          <a:stretch>
+            <a:fillRect/>
+          </a:stretch>
+        </p:blipFill>
+        <p:spPr>
+          <a:xfrm>
+            <a:off x="1676400" y="2202795"/>
+            <a:ext cx="5636440" cy="4537074"/>
+          </a:xfrm>
+          <a:prstGeom prst="rect">
+            <a:avLst/>
+          </a:prstGeom>
+        </p:spPr>
+      </p:pic>
+      <p:sp>
+        <p:nvSpPr>
+          <p:cNvPr id="5" name="TextBox 4"/>
+          <p:cNvSpPr txBox="1"/>
+          <p:nvPr/>
+        </p:nvSpPr>
+        <p:spPr>
+          <a:xfrm>
+            <a:off x="1676400" y="1371600"/>
+            <a:ext cx="5791200" cy="523220"/>
+          </a:xfrm>
+          <a:prstGeom prst="rect">
+            <a:avLst/>
+          </a:prstGeom>
+          <a:noFill/>
+        </p:spPr>
+        <p:txBody>
+          <a:bodyPr wrap="square" rtlCol="0">
+            <a:spAutoFit/>
+          </a:bodyPr>
+          <a:lstStyle/>
+          <a:p>
+            <a:r>
+              <a:rPr lang="en-US" sz="2800" dirty="0" err="1">
+                <a:latin typeface="Consolas" panose="020B0609020204030204" pitchFamily="49" charset="0"/>
+              </a:rPr>
+              <a:t>ticTacToe</a:t>
+            </a:r>
+            <a:r>
+              <a:rPr lang="en-US" sz="2800" dirty="0">
+                <a:latin typeface="Consolas" panose="020B0609020204030204" pitchFamily="49" charset="0"/>
+              </a:rPr>
+              <a:t>[ 1 ][  1 ] = ‘X’;</a:t>
+            </a:r>
+          </a:p>
+        </p:txBody>
+      </p:sp>
+    </p:spTree>
+    <p:extLst>
+      <p:ext uri="{BB962C8B-B14F-4D97-AF65-F5344CB8AC3E}">
+        <p14:creationId xmlns:p14="http://schemas.microsoft.com/office/powerpoint/2010/main" val="242874814"/>
       </p:ext>
     </p:extLst>
   </p:cSld>
@@ -8724,7 +8733,7 @@
           </a:ln>
           <a:extLst>
             <a:ext uri="{C572A759-6A51-4108-AA02-DFA0A04FC94B}">
-              <ma14:wrappingTextBoxFlag xmlns="" xmlns:ma14="http://schemas.microsoft.com/office/mac/drawingml/2011/main" val="1"/>
+              <ma14:wrappingTextBoxFlag xmlns:ma14="http://schemas.microsoft.com/office/mac/drawingml/2011/main" xmlns="" val="1"/>
             </a:ext>
           </a:extLst>
         </p:spPr>
@@ -9467,11 +9476,11 @@
   <p:clrMapOvr>
     <a:masterClrMapping/>
   </p:clrMapOvr>
-  <mc:AlternateContent xmlns:mc="http://schemas.openxmlformats.org/markup-compatibility/2006">
-    <mc:Choice xmlns:p14="http://schemas.microsoft.com/office/powerpoint/2010/main" Requires="p14">
+  <mc:AlternateContent xmlns:mc="http://schemas.openxmlformats.org/markup-compatibility/2006" xmlns:p14="http://schemas.microsoft.com/office/powerpoint/2010/main">
+    <mc:Choice Requires="p14">
       <p:transition spd="slow" p14:dur="2000"/>
     </mc:Choice>
-    <mc:Fallback>
+    <mc:Fallback xmlns="">
       <p:transition spd="slow"/>
     </mc:Fallback>
   </mc:AlternateContent>
@@ -9585,10 +9594,39 @@
           </a:p>
         </p:txBody>
       </p:sp>
+      <p:sp>
+        <p:nvSpPr>
+          <p:cNvPr id="6" name="TextBox 5"/>
+          <p:cNvSpPr txBox="1"/>
+          <p:nvPr/>
+        </p:nvSpPr>
+        <p:spPr>
+          <a:xfrm>
+            <a:off x="5105400" y="4419600"/>
+            <a:ext cx="685800" cy="769441"/>
+          </a:xfrm>
+          <a:prstGeom prst="rect">
+            <a:avLst/>
+          </a:prstGeom>
+          <a:noFill/>
+        </p:spPr>
+        <p:txBody>
+          <a:bodyPr wrap="square" rtlCol="0">
+            <a:spAutoFit/>
+          </a:bodyPr>
+          <a:lstStyle/>
+          <a:p>
+            <a:r>
+              <a:rPr lang="en-US" sz="4400" dirty="0"/>
+              <a:t>X</a:t>
+            </a:r>
+          </a:p>
+        </p:txBody>
+      </p:sp>
     </p:spTree>
     <p:extLst>
       <p:ext uri="{BB962C8B-B14F-4D97-AF65-F5344CB8AC3E}">
-        <p14:creationId xmlns:p14="http://schemas.microsoft.com/office/powerpoint/2010/main" val="242874814"/>
+        <p14:creationId xmlns:p14="http://schemas.microsoft.com/office/powerpoint/2010/main" val="2703764021"/>
       </p:ext>
     </p:extLst>
   </p:cSld>
@@ -9693,7 +9731,7 @@
               <a:rPr lang="en-US" sz="2800" dirty="0">
                 <a:latin typeface="Consolas" panose="020B0609020204030204" pitchFamily="49" charset="0"/>
               </a:rPr>
-              <a:t>[ 1 ][  1 ] = ‘X’;</a:t>
+              <a:t>[ 0 ][  1 ] = ‘O’;</a:t>
             </a:r>
           </a:p>
         </p:txBody>
@@ -9730,13 +9768,21 @@
     </p:spTree>
     <p:extLst>
       <p:ext uri="{BB962C8B-B14F-4D97-AF65-F5344CB8AC3E}">
-        <p14:creationId xmlns:p14="http://schemas.microsoft.com/office/powerpoint/2010/main" val="2703764021"/>
+        <p14:creationId xmlns:p14="http://schemas.microsoft.com/office/powerpoint/2010/main" val="3089089331"/>
       </p:ext>
     </p:extLst>
   </p:cSld>
   <p:clrMapOvr>
     <a:masterClrMapping/>
   </p:clrMapOvr>
+  <mc:AlternateContent xmlns:mc="http://schemas.openxmlformats.org/markup-compatibility/2006" xmlns:p14="http://schemas.microsoft.com/office/powerpoint/2010/main">
+    <mc:Choice Requires="p14">
+      <p:transition spd="slow" p14:dur="2000"/>
+    </mc:Choice>
+    <mc:Fallback xmlns="">
+      <p:transition spd="slow"/>
+    </mc:Fallback>
+  </mc:AlternateContent>
 </p:sld>
 </file>
 
@@ -9869,21 +9915,50 @@
           </a:p>
         </p:txBody>
       </p:sp>
+      <p:sp>
+        <p:nvSpPr>
+          <p:cNvPr id="7" name="TextBox 6"/>
+          <p:cNvSpPr txBox="1"/>
+          <p:nvPr/>
+        </p:nvSpPr>
+        <p:spPr>
+          <a:xfrm>
+            <a:off x="5122178" y="3249722"/>
+            <a:ext cx="685800" cy="769441"/>
+          </a:xfrm>
+          <a:prstGeom prst="rect">
+            <a:avLst/>
+          </a:prstGeom>
+          <a:noFill/>
+        </p:spPr>
+        <p:txBody>
+          <a:bodyPr wrap="square" rtlCol="0">
+            <a:spAutoFit/>
+          </a:bodyPr>
+          <a:lstStyle/>
+          <a:p>
+            <a:r>
+              <a:rPr lang="en-US" sz="4400" dirty="0"/>
+              <a:t>O</a:t>
+            </a:r>
+          </a:p>
+        </p:txBody>
+      </p:sp>
     </p:spTree>
     <p:extLst>
       <p:ext uri="{BB962C8B-B14F-4D97-AF65-F5344CB8AC3E}">
-        <p14:creationId xmlns:p14="http://schemas.microsoft.com/office/powerpoint/2010/main" val="3089089331"/>
+        <p14:creationId xmlns:p14="http://schemas.microsoft.com/office/powerpoint/2010/main" val="4183252574"/>
       </p:ext>
     </p:extLst>
   </p:cSld>
   <p:clrMapOvr>
     <a:masterClrMapping/>
   </p:clrMapOvr>
-  <mc:AlternateContent xmlns:mc="http://schemas.openxmlformats.org/markup-compatibility/2006">
-    <mc:Choice xmlns:p14="http://schemas.microsoft.com/office/powerpoint/2010/main" Requires="p14">
+  <mc:AlternateContent xmlns:mc="http://schemas.openxmlformats.org/markup-compatibility/2006" xmlns:p14="http://schemas.microsoft.com/office/powerpoint/2010/main">
+    <mc:Choice Requires="p14">
       <p:transition spd="slow" p14:dur="2000"/>
     </mc:Choice>
-    <mc:Fallback>
+    <mc:Fallback xmlns="">
       <p:transition spd="slow"/>
     </mc:Fallback>
   </mc:AlternateContent>
@@ -9985,7 +10060,7 @@
               <a:rPr lang="en-US" sz="2800" dirty="0">
                 <a:latin typeface="Consolas" panose="020B0609020204030204" pitchFamily="49" charset="0"/>
               </a:rPr>
-              <a:t>[ 0 ][  1 ] = ‘O’;</a:t>
+              <a:t>[ 2 ][  2 ] = ‘X’;</a:t>
             </a:r>
           </a:p>
         </p:txBody>
@@ -10051,18 +10126,18 @@
     </p:spTree>
     <p:extLst>
       <p:ext uri="{BB962C8B-B14F-4D97-AF65-F5344CB8AC3E}">
-        <p14:creationId xmlns:p14="http://schemas.microsoft.com/office/powerpoint/2010/main" val="4183252574"/>
+        <p14:creationId xmlns:p14="http://schemas.microsoft.com/office/powerpoint/2010/main" val="1109014256"/>
       </p:ext>
     </p:extLst>
   </p:cSld>
   <p:clrMapOvr>
     <a:masterClrMapping/>
   </p:clrMapOvr>
-  <mc:AlternateContent xmlns:mc="http://schemas.openxmlformats.org/markup-compatibility/2006">
-    <mc:Choice xmlns:p14="http://schemas.microsoft.com/office/powerpoint/2010/main" Requires="p14">
+  <mc:AlternateContent xmlns:mc="http://schemas.openxmlformats.org/markup-compatibility/2006" xmlns:p14="http://schemas.microsoft.com/office/powerpoint/2010/main">
+    <mc:Choice Requires="p14">
       <p:transition spd="slow" p14:dur="2000"/>
     </mc:Choice>
-    <mc:Fallback>
+    <mc:Fallback xmlns="">
       <p:transition spd="slow"/>
     </mc:Fallback>
   </mc:AlternateContent>
@@ -10227,21 +10302,50 @@
           </a:p>
         </p:txBody>
       </p:sp>
+      <p:sp>
+        <p:nvSpPr>
+          <p:cNvPr id="8" name="TextBox 7"/>
+          <p:cNvSpPr txBox="1"/>
+          <p:nvPr/>
+        </p:nvSpPr>
+        <p:spPr>
+          <a:xfrm>
+            <a:off x="6172200" y="5638800"/>
+            <a:ext cx="685800" cy="769441"/>
+          </a:xfrm>
+          <a:prstGeom prst="rect">
+            <a:avLst/>
+          </a:prstGeom>
+          <a:noFill/>
+        </p:spPr>
+        <p:txBody>
+          <a:bodyPr wrap="square" rtlCol="0">
+            <a:spAutoFit/>
+          </a:bodyPr>
+          <a:lstStyle/>
+          <a:p>
+            <a:r>
+              <a:rPr lang="en-US" sz="4400" dirty="0"/>
+              <a:t>X</a:t>
+            </a:r>
+          </a:p>
+        </p:txBody>
+      </p:sp>
     </p:spTree>
     <p:extLst>
       <p:ext uri="{BB962C8B-B14F-4D97-AF65-F5344CB8AC3E}">
-        <p14:creationId xmlns:p14="http://schemas.microsoft.com/office/powerpoint/2010/main" val="1109014256"/>
+        <p14:creationId xmlns:p14="http://schemas.microsoft.com/office/powerpoint/2010/main" val="1523799280"/>
       </p:ext>
     </p:extLst>
   </p:cSld>
   <p:clrMapOvr>
     <a:masterClrMapping/>
   </p:clrMapOvr>
-  <mc:AlternateContent xmlns:mc="http://schemas.openxmlformats.org/markup-compatibility/2006">
-    <mc:Choice xmlns:p14="http://schemas.microsoft.com/office/powerpoint/2010/main" Requires="p14">
+  <mc:AlternateContent xmlns:mc="http://schemas.openxmlformats.org/markup-compatibility/2006" xmlns:p14="http://schemas.microsoft.com/office/powerpoint/2010/main">
+    <mc:Choice Requires="p14">
       <p:transition spd="slow" p14:dur="2000"/>
     </mc:Choice>
-    <mc:Fallback>
+    <mc:Fallback xmlns="">
       <p:transition spd="slow"/>
     </mc:Fallback>
   </mc:AlternateContent>
@@ -10343,7 +10447,7 @@
               <a:rPr lang="en-US" sz="2800" dirty="0">
                 <a:latin typeface="Consolas" panose="020B0609020204030204" pitchFamily="49" charset="0"/>
               </a:rPr>
-              <a:t>[ 2 ][  2 ] = ‘X’;</a:t>
+              <a:t>[ 0 ][  0 ] = ‘O’;</a:t>
             </a:r>
           </a:p>
         </p:txBody>
@@ -10438,18 +10542,18 @@
     </p:spTree>
     <p:extLst>
       <p:ext uri="{BB962C8B-B14F-4D97-AF65-F5344CB8AC3E}">
-        <p14:creationId xmlns:p14="http://schemas.microsoft.com/office/powerpoint/2010/main" val="1523799280"/>
+        <p14:creationId xmlns:p14="http://schemas.microsoft.com/office/powerpoint/2010/main" val="3371878340"/>
       </p:ext>
     </p:extLst>
   </p:cSld>
   <p:clrMapOvr>
     <a:masterClrMapping/>
   </p:clrMapOvr>
-  <mc:AlternateContent xmlns:mc="http://schemas.openxmlformats.org/markup-compatibility/2006">
-    <mc:Choice xmlns:p14="http://schemas.microsoft.com/office/powerpoint/2010/main" Requires="p14">
+  <mc:AlternateContent xmlns:mc="http://schemas.openxmlformats.org/markup-compatibility/2006" xmlns:p14="http://schemas.microsoft.com/office/powerpoint/2010/main">
+    <mc:Choice Requires="p14">
       <p:transition spd="slow" p14:dur="2000"/>
     </mc:Choice>
-    <mc:Fallback>
+    <mc:Fallback xmlns="">
       <p:transition spd="slow"/>
     </mc:Fallback>
   </mc:AlternateContent>
@@ -10643,21 +10747,50 @@
           </a:p>
         </p:txBody>
       </p:sp>
+      <p:sp>
+        <p:nvSpPr>
+          <p:cNvPr id="9" name="TextBox 8"/>
+          <p:cNvSpPr txBox="1"/>
+          <p:nvPr/>
+        </p:nvSpPr>
+        <p:spPr>
+          <a:xfrm>
+            <a:off x="4151720" y="3262692"/>
+            <a:ext cx="685800" cy="769441"/>
+          </a:xfrm>
+          <a:prstGeom prst="rect">
+            <a:avLst/>
+          </a:prstGeom>
+          <a:noFill/>
+        </p:spPr>
+        <p:txBody>
+          <a:bodyPr wrap="square" rtlCol="0">
+            <a:spAutoFit/>
+          </a:bodyPr>
+          <a:lstStyle/>
+          <a:p>
+            <a:r>
+              <a:rPr lang="en-US" sz="4400" dirty="0"/>
+              <a:t>O</a:t>
+            </a:r>
+          </a:p>
+        </p:txBody>
+      </p:sp>
     </p:spTree>
     <p:extLst>
       <p:ext uri="{BB962C8B-B14F-4D97-AF65-F5344CB8AC3E}">
-        <p14:creationId xmlns:p14="http://schemas.microsoft.com/office/powerpoint/2010/main" val="3371878340"/>
+        <p14:creationId xmlns:p14="http://schemas.microsoft.com/office/powerpoint/2010/main" val="668435085"/>
       </p:ext>
     </p:extLst>
   </p:cSld>
   <p:clrMapOvr>
     <a:masterClrMapping/>
   </p:clrMapOvr>
-  <mc:AlternateContent xmlns:mc="http://schemas.openxmlformats.org/markup-compatibility/2006">
-    <mc:Choice xmlns:p14="http://schemas.microsoft.com/office/powerpoint/2010/main" Requires="p14">
+  <mc:AlternateContent xmlns:mc="http://schemas.openxmlformats.org/markup-compatibility/2006" xmlns:p14="http://schemas.microsoft.com/office/powerpoint/2010/main">
+    <mc:Choice Requires="p14">
       <p:transition spd="slow" p14:dur="2000"/>
     </mc:Choice>
-    <mc:Fallback>
+    <mc:Fallback xmlns="">
       <p:transition spd="slow"/>
     </mc:Fallback>
   </mc:AlternateContent>
@@ -10759,7 +10892,7 @@
               <a:rPr lang="en-US" sz="2800" dirty="0">
                 <a:latin typeface="Consolas" panose="020B0609020204030204" pitchFamily="49" charset="0"/>
               </a:rPr>
-              <a:t>[ 0 ][  0 ] = ‘O’;</a:t>
+              <a:t>[ 2 ][  0 ] = ‘X’;</a:t>
             </a:r>
           </a:p>
         </p:txBody>
@@ -10883,18 +11016,18 @@
     </p:spTree>
     <p:extLst>
       <p:ext uri="{BB962C8B-B14F-4D97-AF65-F5344CB8AC3E}">
-        <p14:creationId xmlns:p14="http://schemas.microsoft.com/office/powerpoint/2010/main" val="668435085"/>
+        <p14:creationId xmlns:p14="http://schemas.microsoft.com/office/powerpoint/2010/main" val="3355760767"/>
       </p:ext>
     </p:extLst>
   </p:cSld>
   <p:clrMapOvr>
     <a:masterClrMapping/>
   </p:clrMapOvr>
-  <mc:AlternateContent xmlns:mc="http://schemas.openxmlformats.org/markup-compatibility/2006">
-    <mc:Choice xmlns:p14="http://schemas.microsoft.com/office/powerpoint/2010/main" Requires="p14">
+  <mc:AlternateContent xmlns:mc="http://schemas.openxmlformats.org/markup-compatibility/2006" xmlns:p14="http://schemas.microsoft.com/office/powerpoint/2010/main">
+    <mc:Choice Requires="p14">
       <p:transition spd="slow" p14:dur="2000"/>
     </mc:Choice>
-    <mc:Fallback>
+    <mc:Fallback xmlns="">
       <p:transition spd="slow"/>
     </mc:Fallback>
   </mc:AlternateContent>
@@ -11117,21 +11250,50 @@
           </a:p>
         </p:txBody>
       </p:sp>
+      <p:sp>
+        <p:nvSpPr>
+          <p:cNvPr id="10" name="TextBox 9"/>
+          <p:cNvSpPr txBox="1"/>
+          <p:nvPr/>
+        </p:nvSpPr>
+        <p:spPr>
+          <a:xfrm>
+            <a:off x="4151720" y="5638799"/>
+            <a:ext cx="685800" cy="769441"/>
+          </a:xfrm>
+          <a:prstGeom prst="rect">
+            <a:avLst/>
+          </a:prstGeom>
+          <a:noFill/>
+        </p:spPr>
+        <p:txBody>
+          <a:bodyPr wrap="square" rtlCol="0">
+            <a:spAutoFit/>
+          </a:bodyPr>
+          <a:lstStyle/>
+          <a:p>
+            <a:r>
+              <a:rPr lang="en-US" sz="4400" dirty="0"/>
+              <a:t>X</a:t>
+            </a:r>
+          </a:p>
+        </p:txBody>
+      </p:sp>
     </p:spTree>
     <p:extLst>
       <p:ext uri="{BB962C8B-B14F-4D97-AF65-F5344CB8AC3E}">
-        <p14:creationId xmlns:p14="http://schemas.microsoft.com/office/powerpoint/2010/main" val="3355760767"/>
+        <p14:creationId xmlns:p14="http://schemas.microsoft.com/office/powerpoint/2010/main" val="3358265216"/>
       </p:ext>
     </p:extLst>
   </p:cSld>
   <p:clrMapOvr>
     <a:masterClrMapping/>
   </p:clrMapOvr>
-  <mc:AlternateContent xmlns:mc="http://schemas.openxmlformats.org/markup-compatibility/2006">
-    <mc:Choice xmlns:p14="http://schemas.microsoft.com/office/powerpoint/2010/main" Requires="p14">
+  <mc:AlternateContent xmlns:mc="http://schemas.openxmlformats.org/markup-compatibility/2006" xmlns:p14="http://schemas.microsoft.com/office/powerpoint/2010/main">
+    <mc:Choice Requires="p14">
       <p:transition spd="slow" p14:dur="2000"/>
     </mc:Choice>
-    <mc:Fallback>
+    <mc:Fallback xmlns="">
       <p:transition spd="slow"/>
     </mc:Fallback>
   </mc:AlternateContent>
@@ -11233,7 +11395,7 @@
               <a:rPr lang="en-US" sz="2800" dirty="0">
                 <a:latin typeface="Consolas" panose="020B0609020204030204" pitchFamily="49" charset="0"/>
               </a:rPr>
-              <a:t>[ 2 ][  0 ] = ‘X’;</a:t>
+              <a:t>[ 2 ][  1 ] = ‘O’;</a:t>
             </a:r>
           </a:p>
         </p:txBody>
@@ -11386,18 +11548,18 @@
     </p:spTree>
     <p:extLst>
       <p:ext uri="{BB962C8B-B14F-4D97-AF65-F5344CB8AC3E}">
-        <p14:creationId xmlns:p14="http://schemas.microsoft.com/office/powerpoint/2010/main" val="3358265216"/>
+        <p14:creationId xmlns:p14="http://schemas.microsoft.com/office/powerpoint/2010/main" val="853083052"/>
       </p:ext>
     </p:extLst>
   </p:cSld>
   <p:clrMapOvr>
     <a:masterClrMapping/>
   </p:clrMapOvr>
-  <mc:AlternateContent xmlns:mc="http://schemas.openxmlformats.org/markup-compatibility/2006">
-    <mc:Choice xmlns:p14="http://schemas.microsoft.com/office/powerpoint/2010/main" Requires="p14">
+  <mc:AlternateContent xmlns:mc="http://schemas.openxmlformats.org/markup-compatibility/2006" xmlns:p14="http://schemas.microsoft.com/office/powerpoint/2010/main">
+    <mc:Choice Requires="p14">
       <p:transition spd="slow" p14:dur="2000"/>
     </mc:Choice>
-    <mc:Fallback>
+    <mc:Fallback xmlns="">
       <p:transition spd="slow"/>
     </mc:Fallback>
   </mc:AlternateContent>
@@ -11721,21 +11883,50 @@
           </a:p>
         </p:txBody>
       </p:sp>
+      <p:sp>
+        <p:nvSpPr>
+          <p:cNvPr id="11" name="TextBox 10"/>
+          <p:cNvSpPr txBox="1"/>
+          <p:nvPr/>
+        </p:nvSpPr>
+        <p:spPr>
+          <a:xfrm>
+            <a:off x="5074443" y="5632645"/>
+            <a:ext cx="685800" cy="769441"/>
+          </a:xfrm>
+          <a:prstGeom prst="rect">
+            <a:avLst/>
+          </a:prstGeom>
+          <a:noFill/>
+        </p:spPr>
+        <p:txBody>
+          <a:bodyPr wrap="square" rtlCol="0">
+            <a:spAutoFit/>
+          </a:bodyPr>
+          <a:lstStyle/>
+          <a:p>
+            <a:r>
+              <a:rPr lang="en-US" sz="4400" dirty="0"/>
+              <a:t>O</a:t>
+            </a:r>
+          </a:p>
+        </p:txBody>
+      </p:sp>
     </p:spTree>
     <p:extLst>
       <p:ext uri="{BB962C8B-B14F-4D97-AF65-F5344CB8AC3E}">
-        <p14:creationId xmlns:p14="http://schemas.microsoft.com/office/powerpoint/2010/main" val="853083052"/>
+        <p14:creationId xmlns:p14="http://schemas.microsoft.com/office/powerpoint/2010/main" val="2582998312"/>
       </p:ext>
     </p:extLst>
   </p:cSld>
   <p:clrMapOvr>
     <a:masterClrMapping/>
   </p:clrMapOvr>
-  <mc:AlternateContent xmlns:mc="http://schemas.openxmlformats.org/markup-compatibility/2006">
-    <mc:Choice xmlns:p14="http://schemas.microsoft.com/office/powerpoint/2010/main" Requires="p14">
+  <mc:AlternateContent xmlns:mc="http://schemas.openxmlformats.org/markup-compatibility/2006" xmlns:p14="http://schemas.microsoft.com/office/powerpoint/2010/main">
+    <mc:Choice Requires="p14">
       <p:transition spd="slow" p14:dur="2000"/>
     </mc:Choice>
-    <mc:Fallback>
+    <mc:Fallback xmlns="">
       <p:transition spd="slow"/>
     </mc:Fallback>
   </mc:AlternateContent>
@@ -11837,7 +12028,7 @@
               <a:rPr lang="en-US" sz="2800" dirty="0">
                 <a:latin typeface="Consolas" panose="020B0609020204030204" pitchFamily="49" charset="0"/>
               </a:rPr>
-              <a:t>[ 2 ][  1 ] = ‘O’;</a:t>
+              <a:t>[ 0 ][  2 ] = ‘X’;</a:t>
             </a:r>
           </a:p>
         </p:txBody>
@@ -12019,18 +12210,18 @@
     </p:spTree>
     <p:extLst>
       <p:ext uri="{BB962C8B-B14F-4D97-AF65-F5344CB8AC3E}">
-        <p14:creationId xmlns:p14="http://schemas.microsoft.com/office/powerpoint/2010/main" val="2582998312"/>
+        <p14:creationId xmlns:p14="http://schemas.microsoft.com/office/powerpoint/2010/main" val="1124989575"/>
       </p:ext>
     </p:extLst>
   </p:cSld>
   <p:clrMapOvr>
     <a:masterClrMapping/>
   </p:clrMapOvr>
-  <mc:AlternateContent xmlns:mc="http://schemas.openxmlformats.org/markup-compatibility/2006">
-    <mc:Choice xmlns:p14="http://schemas.microsoft.com/office/powerpoint/2010/main" Requires="p14">
+  <mc:AlternateContent xmlns:mc="http://schemas.openxmlformats.org/markup-compatibility/2006" xmlns:p14="http://schemas.microsoft.com/office/powerpoint/2010/main">
+    <mc:Choice Requires="p14">
       <p:transition spd="slow" p14:dur="2000"/>
     </mc:Choice>
-    <mc:Fallback>
+    <mc:Fallback xmlns="">
       <p:transition spd="slow"/>
     </mc:Fallback>
   </mc:AlternateContent>
@@ -12311,21 +12502,50 @@
           </a:p>
         </p:txBody>
       </p:sp>
+      <p:sp>
+        <p:nvSpPr>
+          <p:cNvPr id="12" name="TextBox 11"/>
+          <p:cNvSpPr txBox="1"/>
+          <p:nvPr/>
+        </p:nvSpPr>
+        <p:spPr>
+          <a:xfrm>
+            <a:off x="6165908" y="3230598"/>
+            <a:ext cx="685800" cy="769441"/>
+          </a:xfrm>
+          <a:prstGeom prst="rect">
+            <a:avLst/>
+          </a:prstGeom>
+          <a:noFill/>
+        </p:spPr>
+        <p:txBody>
+          <a:bodyPr wrap="square" rtlCol="0">
+            <a:spAutoFit/>
+          </a:bodyPr>
+          <a:lstStyle/>
+          <a:p>
+            <a:r>
+              <a:rPr lang="en-US" sz="4400" dirty="0"/>
+              <a:t>X</a:t>
+            </a:r>
+          </a:p>
+        </p:txBody>
+      </p:sp>
     </p:spTree>
     <p:extLst>
       <p:ext uri="{BB962C8B-B14F-4D97-AF65-F5344CB8AC3E}">
-        <p14:creationId xmlns:p14="http://schemas.microsoft.com/office/powerpoint/2010/main" val="1124989575"/>
+        <p14:creationId xmlns:p14="http://schemas.microsoft.com/office/powerpoint/2010/main" val="2705992349"/>
       </p:ext>
     </p:extLst>
   </p:cSld>
   <p:clrMapOvr>
     <a:masterClrMapping/>
   </p:clrMapOvr>
-  <mc:AlternateContent xmlns:mc="http://schemas.openxmlformats.org/markup-compatibility/2006">
-    <mc:Choice xmlns:p14="http://schemas.microsoft.com/office/powerpoint/2010/main" Requires="p14">
+  <mc:AlternateContent xmlns:mc="http://schemas.openxmlformats.org/markup-compatibility/2006" xmlns:p14="http://schemas.microsoft.com/office/powerpoint/2010/main">
+    <mc:Choice Requires="p14">
       <p:transition spd="slow" p14:dur="2000"/>
     </mc:Choice>
-    <mc:Fallback>
+    <mc:Fallback xmlns="">
       <p:transition spd="slow"/>
     </mc:Fallback>
   </mc:AlternateContent>
@@ -12366,271 +12586,96 @@
           <a:p>
             <a:r>
               <a:rPr lang="en-US" dirty="0"/>
-              <a:t>Creating a 2D char array</a:t>
-            </a:r>
-          </a:p>
-        </p:txBody>
-      </p:sp>
-      <p:pic>
-        <p:nvPicPr>
-          <p:cNvPr id="3" name="Picture 2"/>
-          <p:cNvPicPr>
-            <a:picLocks noChangeAspect="1"/>
-          </p:cNvPicPr>
-          <p:nvPr/>
-        </p:nvPicPr>
-        <p:blipFill>
-          <a:blip r:embed="rId2"/>
-          <a:stretch>
-            <a:fillRect/>
-          </a:stretch>
-        </p:blipFill>
-        <p:spPr>
-          <a:xfrm>
-            <a:off x="1676400" y="2202795"/>
-            <a:ext cx="5636440" cy="4537074"/>
-          </a:xfrm>
-          <a:prstGeom prst="rect">
-            <a:avLst/>
-          </a:prstGeom>
-        </p:spPr>
-      </p:pic>
-      <p:sp>
-        <p:nvSpPr>
-          <p:cNvPr id="5" name="TextBox 4"/>
-          <p:cNvSpPr txBox="1"/>
-          <p:nvPr/>
-        </p:nvSpPr>
-        <p:spPr>
-          <a:xfrm>
-            <a:off x="1676400" y="1371600"/>
-            <a:ext cx="5791200" cy="523220"/>
-          </a:xfrm>
-          <a:prstGeom prst="rect">
-            <a:avLst/>
-          </a:prstGeom>
-          <a:noFill/>
-        </p:spPr>
-        <p:txBody>
-          <a:bodyPr wrap="square" rtlCol="0">
-            <a:spAutoFit/>
+              <a:t>2D array dimensions</a:t>
+            </a:r>
+          </a:p>
+        </p:txBody>
+      </p:sp>
+      <p:sp>
+        <p:nvSpPr>
+          <p:cNvPr id="3" name="Content Placeholder 2"/>
+          <p:cNvSpPr>
+            <a:spLocks noGrp="1"/>
+          </p:cNvSpPr>
+          <p:nvPr>
+            <p:ph idx="1"/>
+          </p:nvPr>
+        </p:nvSpPr>
+        <p:spPr/>
+        <p:txBody>
+          <a:bodyPr>
+            <a:normAutofit/>
           </a:bodyPr>
           <a:lstStyle/>
           <a:p>
-            <a:r>
-              <a:rPr lang="en-US" sz="2800" dirty="0" err="1">
-                <a:latin typeface="Consolas" panose="020B0609020204030204" pitchFamily="49" charset="0"/>
-              </a:rPr>
-              <a:t>ticTacToe</a:t>
-            </a:r>
-            <a:r>
-              <a:rPr lang="en-US" sz="2800" dirty="0">
-                <a:latin typeface="Consolas" panose="020B0609020204030204" pitchFamily="49" charset="0"/>
-              </a:rPr>
-              <a:t>[ 0 ][  2 ] = ‘X’;</a:t>
-            </a:r>
-          </a:p>
-        </p:txBody>
-      </p:sp>
-      <p:sp>
-        <p:nvSpPr>
-          <p:cNvPr id="6" name="TextBox 5"/>
-          <p:cNvSpPr txBox="1"/>
-          <p:nvPr/>
-        </p:nvSpPr>
-        <p:spPr>
-          <a:xfrm>
-            <a:off x="5105400" y="4419600"/>
-            <a:ext cx="685800" cy="769441"/>
-          </a:xfrm>
-          <a:prstGeom prst="rect">
-            <a:avLst/>
-          </a:prstGeom>
-          <a:noFill/>
-        </p:spPr>
-        <p:txBody>
-          <a:bodyPr wrap="square" rtlCol="0">
-            <a:spAutoFit/>
-          </a:bodyPr>
-          <a:lstStyle/>
-          <a:p>
-            <a:r>
-              <a:rPr lang="en-US" sz="4400" dirty="0"/>
-              <a:t>X</a:t>
-            </a:r>
-          </a:p>
-        </p:txBody>
-      </p:sp>
-      <p:sp>
-        <p:nvSpPr>
-          <p:cNvPr id="7" name="TextBox 6"/>
-          <p:cNvSpPr txBox="1"/>
-          <p:nvPr/>
-        </p:nvSpPr>
-        <p:spPr>
-          <a:xfrm>
-            <a:off x="5122178" y="3249722"/>
-            <a:ext cx="685800" cy="769441"/>
-          </a:xfrm>
-          <a:prstGeom prst="rect">
-            <a:avLst/>
-          </a:prstGeom>
-          <a:noFill/>
-        </p:spPr>
-        <p:txBody>
-          <a:bodyPr wrap="square" rtlCol="0">
-            <a:spAutoFit/>
-          </a:bodyPr>
-          <a:lstStyle/>
-          <a:p>
-            <a:r>
-              <a:rPr lang="en-US" sz="4400" dirty="0"/>
-              <a:t>O</a:t>
-            </a:r>
-          </a:p>
-        </p:txBody>
-      </p:sp>
-      <p:sp>
-        <p:nvSpPr>
-          <p:cNvPr id="8" name="TextBox 7"/>
-          <p:cNvSpPr txBox="1"/>
-          <p:nvPr/>
-        </p:nvSpPr>
-        <p:spPr>
-          <a:xfrm>
-            <a:off x="6172200" y="5638800"/>
-            <a:ext cx="685800" cy="769441"/>
-          </a:xfrm>
-          <a:prstGeom prst="rect">
-            <a:avLst/>
-          </a:prstGeom>
-          <a:noFill/>
-        </p:spPr>
-        <p:txBody>
-          <a:bodyPr wrap="square" rtlCol="0">
-            <a:spAutoFit/>
-          </a:bodyPr>
-          <a:lstStyle/>
-          <a:p>
-            <a:r>
-              <a:rPr lang="en-US" sz="4400" dirty="0"/>
-              <a:t>X</a:t>
-            </a:r>
-          </a:p>
-        </p:txBody>
-      </p:sp>
-      <p:sp>
-        <p:nvSpPr>
-          <p:cNvPr id="9" name="TextBox 8"/>
-          <p:cNvSpPr txBox="1"/>
-          <p:nvPr/>
-        </p:nvSpPr>
-        <p:spPr>
-          <a:xfrm>
-            <a:off x="4151720" y="3262692"/>
-            <a:ext cx="685800" cy="769441"/>
-          </a:xfrm>
-          <a:prstGeom prst="rect">
-            <a:avLst/>
-          </a:prstGeom>
-          <a:noFill/>
-        </p:spPr>
-        <p:txBody>
-          <a:bodyPr wrap="square" rtlCol="0">
-            <a:spAutoFit/>
-          </a:bodyPr>
-          <a:lstStyle/>
-          <a:p>
-            <a:r>
-              <a:rPr lang="en-US" sz="4400" dirty="0"/>
-              <a:t>O</a:t>
-            </a:r>
-          </a:p>
-        </p:txBody>
-      </p:sp>
-      <p:sp>
-        <p:nvSpPr>
-          <p:cNvPr id="10" name="TextBox 9"/>
-          <p:cNvSpPr txBox="1"/>
-          <p:nvPr/>
-        </p:nvSpPr>
-        <p:spPr>
-          <a:xfrm>
-            <a:off x="4151720" y="5638799"/>
-            <a:ext cx="685800" cy="769441"/>
-          </a:xfrm>
-          <a:prstGeom prst="rect">
-            <a:avLst/>
-          </a:prstGeom>
-          <a:noFill/>
-        </p:spPr>
-        <p:txBody>
-          <a:bodyPr wrap="square" rtlCol="0">
-            <a:spAutoFit/>
-          </a:bodyPr>
-          <a:lstStyle/>
-          <a:p>
-            <a:r>
-              <a:rPr lang="en-US" sz="4400" dirty="0"/>
-              <a:t>X</a:t>
-            </a:r>
-          </a:p>
-        </p:txBody>
-      </p:sp>
-      <p:sp>
-        <p:nvSpPr>
-          <p:cNvPr id="11" name="TextBox 10"/>
-          <p:cNvSpPr txBox="1"/>
-          <p:nvPr/>
-        </p:nvSpPr>
-        <p:spPr>
-          <a:xfrm>
-            <a:off x="5074443" y="5632645"/>
-            <a:ext cx="685800" cy="769441"/>
-          </a:xfrm>
-          <a:prstGeom prst="rect">
-            <a:avLst/>
-          </a:prstGeom>
-          <a:noFill/>
-        </p:spPr>
-        <p:txBody>
-          <a:bodyPr wrap="square" rtlCol="0">
-            <a:spAutoFit/>
-          </a:bodyPr>
-          <a:lstStyle/>
-          <a:p>
-            <a:r>
-              <a:rPr lang="en-US" sz="4400" dirty="0"/>
-              <a:t>O</a:t>
-            </a:r>
-          </a:p>
-        </p:txBody>
-      </p:sp>
-      <p:sp>
-        <p:nvSpPr>
-          <p:cNvPr id="12" name="TextBox 11"/>
-          <p:cNvSpPr txBox="1"/>
-          <p:nvPr/>
-        </p:nvSpPr>
-        <p:spPr>
-          <a:xfrm>
-            <a:off x="6165908" y="3230598"/>
-            <a:ext cx="685800" cy="769441"/>
-          </a:xfrm>
-          <a:prstGeom prst="rect">
-            <a:avLst/>
-          </a:prstGeom>
-          <a:noFill/>
-        </p:spPr>
-        <p:txBody>
-          <a:bodyPr wrap="square" rtlCol="0">
-            <a:spAutoFit/>
-          </a:bodyPr>
-          <a:lstStyle/>
-          <a:p>
-            <a:r>
-              <a:rPr lang="en-US" sz="4400" dirty="0"/>
-              <a:t>X</a:t>
+            <a:pPr marL="0" indent="0">
+              <a:buNone/>
+            </a:pPr>
+            <a:r>
+              <a:rPr lang="en-US" dirty="0" err="1"/>
+              <a:t>int</a:t>
+            </a:r>
+            <a:r>
+              <a:rPr lang="en-US" dirty="0"/>
+              <a:t>[][] </a:t>
+            </a:r>
+            <a:r>
+              <a:rPr lang="en-US" dirty="0" err="1"/>
+              <a:t>numArray</a:t>
+            </a:r>
+            <a:r>
+              <a:rPr lang="en-US" dirty="0"/>
+              <a:t> = new </a:t>
+            </a:r>
+            <a:r>
+              <a:rPr lang="en-US" dirty="0" err="1"/>
+              <a:t>int</a:t>
+            </a:r>
+            <a:r>
+              <a:rPr lang="en-US" dirty="0"/>
+              <a:t>[2][4];</a:t>
+            </a:r>
+          </a:p>
+          <a:p>
+            <a:pPr marL="0" indent="0">
+              <a:buNone/>
+            </a:pPr>
+            <a:r>
+              <a:rPr lang="en-US" dirty="0" err="1"/>
+              <a:t>int</a:t>
+            </a:r>
+            <a:r>
+              <a:rPr lang="en-US" dirty="0"/>
+              <a:t> rows = </a:t>
+            </a:r>
+            <a:r>
+              <a:rPr lang="en-US" dirty="0" err="1"/>
+              <a:t>numArray.length</a:t>
+            </a:r>
+            <a:r>
+              <a:rPr lang="en-US" dirty="0"/>
+              <a:t>;</a:t>
+            </a:r>
+          </a:p>
+          <a:p>
+            <a:pPr marL="0" indent="0">
+              <a:buNone/>
+            </a:pPr>
+            <a:r>
+              <a:rPr lang="en-US" dirty="0" err="1"/>
+              <a:t>int</a:t>
+            </a:r>
+            <a:r>
+              <a:rPr lang="en-US" dirty="0"/>
+              <a:t> cols = </a:t>
+            </a:r>
+            <a:r>
+              <a:rPr lang="en-US" dirty="0" err="1"/>
+              <a:t>numArray</a:t>
+            </a:r>
+            <a:r>
+              <a:rPr lang="en-US" dirty="0"/>
+              <a:t>[0].length;</a:t>
             </a:r>
           </a:p>
         </p:txBody>
@@ -12638,21 +12683,13 @@
     </p:spTree>
     <p:extLst>
       <p:ext uri="{BB962C8B-B14F-4D97-AF65-F5344CB8AC3E}">
-        <p14:creationId xmlns:p14="http://schemas.microsoft.com/office/powerpoint/2010/main" val="2705992349"/>
+        <p14:creationId xmlns:p14="http://schemas.microsoft.com/office/powerpoint/2010/main" val="278095655"/>
       </p:ext>
     </p:extLst>
   </p:cSld>
   <p:clrMapOvr>
     <a:masterClrMapping/>
   </p:clrMapOvr>
-  <mc:AlternateContent xmlns:mc="http://schemas.openxmlformats.org/markup-compatibility/2006">
-    <mc:Choice xmlns:p14="http://schemas.microsoft.com/office/powerpoint/2010/main" Requires="p14">
-      <p:transition spd="slow" p14:dur="2000"/>
-    </mc:Choice>
-    <mc:Fallback>
-      <p:transition spd="slow"/>
-    </mc:Fallback>
-  </mc:AlternateContent>
 </p:sld>
 </file>
 
@@ -12695,99 +12732,78 @@
           </a:p>
         </p:txBody>
       </p:sp>
-      <p:sp>
-        <p:nvSpPr>
-          <p:cNvPr id="3" name="Content Placeholder 2"/>
-          <p:cNvSpPr>
-            <a:spLocks noGrp="1"/>
-          </p:cNvSpPr>
-          <p:nvPr>
-            <p:ph idx="1"/>
-          </p:nvPr>
-        </p:nvSpPr>
-        <p:spPr/>
-        <p:txBody>
-          <a:bodyPr>
-            <a:normAutofit/>
+      <p:pic>
+        <p:nvPicPr>
+          <p:cNvPr id="5" name="Picture 4"/>
+          <p:cNvPicPr>
+            <a:picLocks noChangeAspect="1"/>
+          </p:cNvPicPr>
+          <p:nvPr/>
+        </p:nvPicPr>
+        <p:blipFill>
+          <a:blip r:embed="rId2"/>
+          <a:stretch>
+            <a:fillRect/>
+          </a:stretch>
+        </p:blipFill>
+        <p:spPr>
+          <a:xfrm>
+            <a:off x="2399636" y="1411346"/>
+            <a:ext cx="6287164" cy="4879588"/>
+          </a:xfrm>
+          <a:prstGeom prst="rect">
+            <a:avLst/>
+          </a:prstGeom>
+        </p:spPr>
+      </p:pic>
+      <p:sp>
+        <p:nvSpPr>
+          <p:cNvPr id="6" name="TextBox 5"/>
+          <p:cNvSpPr txBox="1"/>
+          <p:nvPr/>
+        </p:nvSpPr>
+        <p:spPr>
+          <a:xfrm>
+            <a:off x="304800" y="3276600"/>
+            <a:ext cx="1942436" cy="2246769"/>
+          </a:xfrm>
+          <a:prstGeom prst="rect">
+            <a:avLst/>
+          </a:prstGeom>
+          <a:noFill/>
+        </p:spPr>
+        <p:txBody>
+          <a:bodyPr wrap="square" rtlCol="0">
+            <a:spAutoFit/>
           </a:bodyPr>
           <a:lstStyle/>
           <a:p>
-            <a:pPr marL="0" indent="0">
-              <a:buNone/>
-            </a:pPr>
-            <a:r>
-              <a:rPr lang="en-US" dirty="0" err="1"/>
-              <a:t>int</a:t>
-            </a:r>
-            <a:r>
-              <a:rPr lang="en-US" dirty="0"/>
-              <a:t>[][] </a:t>
-            </a:r>
-            <a:r>
-              <a:rPr lang="en-US" dirty="0" err="1"/>
-              <a:t>numArray</a:t>
-            </a:r>
-            <a:r>
-              <a:rPr lang="en-US" dirty="0"/>
-              <a:t> = new </a:t>
-            </a:r>
-            <a:r>
-              <a:rPr lang="en-US" dirty="0" err="1"/>
-              <a:t>int</a:t>
-            </a:r>
-            <a:r>
-              <a:rPr lang="en-US" dirty="0"/>
-              <a:t>[2][4];</a:t>
-            </a:r>
-          </a:p>
-          <a:p>
-            <a:pPr marL="0" indent="0">
-              <a:buNone/>
-            </a:pPr>
-            <a:r>
-              <a:rPr lang="en-US" dirty="0" err="1"/>
-              <a:t>int</a:t>
-            </a:r>
-            <a:r>
-              <a:rPr lang="en-US" dirty="0"/>
-              <a:t> rows = </a:t>
-            </a:r>
-            <a:r>
-              <a:rPr lang="en-US" dirty="0" err="1"/>
-              <a:t>numArray.length</a:t>
-            </a:r>
-            <a:r>
-              <a:rPr lang="en-US" dirty="0"/>
-              <a:t>;</a:t>
-            </a:r>
-          </a:p>
-          <a:p>
-            <a:pPr marL="0" indent="0">
-              <a:buNone/>
-            </a:pPr>
-            <a:r>
-              <a:rPr lang="en-US" dirty="0" err="1"/>
-              <a:t>int</a:t>
-            </a:r>
-            <a:r>
-              <a:rPr lang="en-US" dirty="0"/>
-              <a:t> cols = </a:t>
-            </a:r>
-            <a:r>
-              <a:rPr lang="en-US" dirty="0" err="1"/>
-              <a:t>numArray</a:t>
-            </a:r>
-            <a:r>
-              <a:rPr lang="en-US" dirty="0"/>
-              <a:t>[0].length;</a:t>
-            </a:r>
+            <a:r>
+              <a:rPr lang="en-US" sz="2800" dirty="0"/>
+              <a:t>2 rows</a:t>
+            </a:r>
+          </a:p>
+          <a:p>
+            <a:r>
+              <a:rPr lang="en-US" sz="2800" dirty="0"/>
+              <a:t>4 columns</a:t>
+            </a:r>
+          </a:p>
+          <a:p>
+            <a:endParaRPr lang="en-US" sz="2800" dirty="0"/>
+          </a:p>
+          <a:p>
+            <a:endParaRPr lang="en-US" sz="2800" dirty="0"/>
+          </a:p>
+          <a:p>
+            <a:endParaRPr lang="en-US" sz="2800" dirty="0"/>
           </a:p>
         </p:txBody>
       </p:sp>
     </p:spTree>
     <p:extLst>
       <p:ext uri="{BB962C8B-B14F-4D97-AF65-F5344CB8AC3E}">
-        <p14:creationId xmlns:p14="http://schemas.microsoft.com/office/powerpoint/2010/main" val="278095655"/>
+        <p14:creationId xmlns:p14="http://schemas.microsoft.com/office/powerpoint/2010/main" val="1626782504"/>
       </p:ext>
     </p:extLst>
   </p:cSld>
@@ -12831,89 +12847,208 @@
           <a:p>
             <a:r>
               <a:rPr lang="en-US" dirty="0"/>
-              <a:t>2D array dimensions</a:t>
-            </a:r>
-          </a:p>
-        </p:txBody>
-      </p:sp>
-      <p:pic>
-        <p:nvPicPr>
-          <p:cNvPr id="5" name="Picture 4"/>
-          <p:cNvPicPr>
-            <a:picLocks noChangeAspect="1"/>
-          </p:cNvPicPr>
-          <p:nvPr/>
-        </p:nvPicPr>
-        <p:blipFill>
-          <a:blip r:embed="rId2"/>
-          <a:stretch>
-            <a:fillRect/>
-          </a:stretch>
-        </p:blipFill>
-        <p:spPr>
-          <a:xfrm>
-            <a:off x="2399636" y="1411346"/>
-            <a:ext cx="6287164" cy="4879588"/>
-          </a:xfrm>
-          <a:prstGeom prst="rect">
-            <a:avLst/>
-          </a:prstGeom>
-        </p:spPr>
-      </p:pic>
-      <p:sp>
-        <p:nvSpPr>
-          <p:cNvPr id="6" name="TextBox 5"/>
-          <p:cNvSpPr txBox="1"/>
-          <p:nvPr/>
-        </p:nvSpPr>
-        <p:spPr>
-          <a:xfrm>
-            <a:off x="304800" y="3276600"/>
-            <a:ext cx="1942436" cy="2246769"/>
-          </a:xfrm>
-          <a:prstGeom prst="rect">
-            <a:avLst/>
-          </a:prstGeom>
-          <a:noFill/>
-        </p:spPr>
-        <p:txBody>
-          <a:bodyPr wrap="square" rtlCol="0">
-            <a:spAutoFit/>
+              <a:t>Iterate through 2D array?</a:t>
+            </a:r>
+          </a:p>
+        </p:txBody>
+      </p:sp>
+      <p:sp>
+        <p:nvSpPr>
+          <p:cNvPr id="3" name="Content Placeholder 2"/>
+          <p:cNvSpPr>
+            <a:spLocks noGrp="1"/>
+          </p:cNvSpPr>
+          <p:nvPr>
+            <p:ph idx="1"/>
+          </p:nvPr>
+        </p:nvSpPr>
+        <p:spPr/>
+        <p:txBody>
+          <a:bodyPr>
+            <a:normAutofit fontScale="85000" lnSpcReduction="20000"/>
           </a:bodyPr>
           <a:lstStyle/>
           <a:p>
-            <a:r>
-              <a:rPr lang="en-US" sz="2800" dirty="0"/>
-              <a:t>2 rows</a:t>
-            </a:r>
-          </a:p>
-          <a:p>
-            <a:r>
-              <a:rPr lang="en-US" sz="2800" dirty="0"/>
-              <a:t>4 columns</a:t>
-            </a:r>
-          </a:p>
-          <a:p>
-            <a:endParaRPr lang="en-US" sz="2800" dirty="0"/>
-          </a:p>
-          <a:p>
-            <a:endParaRPr lang="en-US" sz="2800" dirty="0"/>
-          </a:p>
-          <a:p>
-            <a:endParaRPr lang="en-US" sz="2800" dirty="0"/>
+            <a:pPr marL="0" indent="0">
+              <a:buNone/>
+            </a:pPr>
+            <a:r>
+              <a:rPr lang="en-US" dirty="0" err="1"/>
+              <a:t>int</a:t>
+            </a:r>
+            <a:r>
+              <a:rPr lang="en-US" dirty="0"/>
+              <a:t>[][] </a:t>
+            </a:r>
+            <a:r>
+              <a:rPr lang="en-US" dirty="0" err="1"/>
+              <a:t>numArray</a:t>
+            </a:r>
+            <a:r>
+              <a:rPr lang="en-US" dirty="0"/>
+              <a:t> = </a:t>
+            </a:r>
+            <a:r>
+              <a:rPr lang="en-US" b="1" dirty="0"/>
+              <a:t>new</a:t>
+            </a:r>
+            <a:r>
+              <a:rPr lang="en-US" dirty="0"/>
+              <a:t> </a:t>
+            </a:r>
+            <a:r>
+              <a:rPr lang="en-US" dirty="0" err="1"/>
+              <a:t>int</a:t>
+            </a:r>
+            <a:r>
+              <a:rPr lang="en-US" dirty="0"/>
+              <a:t>[2][4];</a:t>
+            </a:r>
+          </a:p>
+          <a:p>
+            <a:pPr marL="0" indent="0">
+              <a:buNone/>
+            </a:pPr>
+            <a:r>
+              <a:rPr lang="en-US" dirty="0" err="1"/>
+              <a:t>int</a:t>
+            </a:r>
+            <a:r>
+              <a:rPr lang="en-US" dirty="0"/>
+              <a:t> rows = </a:t>
+            </a:r>
+            <a:r>
+              <a:rPr lang="en-US" dirty="0" err="1"/>
+              <a:t>numArray.length</a:t>
+            </a:r>
+            <a:r>
+              <a:rPr lang="en-US" dirty="0"/>
+              <a:t>;</a:t>
+            </a:r>
+          </a:p>
+          <a:p>
+            <a:pPr marL="0" indent="0">
+              <a:buNone/>
+            </a:pPr>
+            <a:r>
+              <a:rPr lang="en-US" dirty="0" err="1"/>
+              <a:t>int</a:t>
+            </a:r>
+            <a:r>
+              <a:rPr lang="en-US" dirty="0"/>
+              <a:t> cols = </a:t>
+            </a:r>
+            <a:r>
+              <a:rPr lang="en-US" dirty="0" err="1"/>
+              <a:t>numArray</a:t>
+            </a:r>
+            <a:r>
+              <a:rPr lang="en-US" dirty="0"/>
+              <a:t>[0].length;</a:t>
+            </a:r>
+          </a:p>
+          <a:p>
+            <a:pPr marL="0" indent="0">
+              <a:buNone/>
+            </a:pPr>
+            <a:r>
+              <a:rPr lang="en-US" dirty="0" err="1"/>
+              <a:t>int</a:t>
+            </a:r>
+            <a:r>
+              <a:rPr lang="en-US" dirty="0"/>
+              <a:t> count = 0;</a:t>
+            </a:r>
+          </a:p>
+          <a:p>
+            <a:pPr marL="0" indent="0">
+              <a:buNone/>
+            </a:pPr>
+            <a:r>
+              <a:rPr lang="en-US" dirty="0"/>
+              <a:t>for (int r = 0; r &lt; rows; r ++ ) {</a:t>
+            </a:r>
+          </a:p>
+          <a:p>
+            <a:pPr marL="0" indent="0">
+              <a:buNone/>
+            </a:pPr>
+            <a:r>
+              <a:rPr lang="en-US" dirty="0"/>
+              <a:t>	for (int c = 0; c &lt; cols; </a:t>
+            </a:r>
+            <a:r>
+              <a:rPr lang="en-US" dirty="0" err="1"/>
+              <a:t>c++</a:t>
+            </a:r>
+            <a:r>
+              <a:rPr lang="en-US" dirty="0"/>
+              <a:t>) {</a:t>
+            </a:r>
+          </a:p>
+          <a:p>
+            <a:pPr marL="0" indent="0">
+              <a:buNone/>
+            </a:pPr>
+            <a:r>
+              <a:rPr lang="en-US" dirty="0"/>
+              <a:t>		 </a:t>
+            </a:r>
+            <a:r>
+              <a:rPr lang="en-US" dirty="0" err="1"/>
+              <a:t>numArray</a:t>
+            </a:r>
+            <a:r>
+              <a:rPr lang="en-US" dirty="0"/>
+              <a:t>[r][c] = count;</a:t>
+            </a:r>
+          </a:p>
+          <a:p>
+            <a:pPr marL="0" indent="0">
+              <a:buNone/>
+            </a:pPr>
+            <a:r>
+              <a:rPr lang="en-US" dirty="0"/>
+              <a:t>		count ++;</a:t>
+            </a:r>
+          </a:p>
+          <a:p>
+            <a:pPr marL="0" indent="0">
+              <a:buNone/>
+            </a:pPr>
+            <a:r>
+              <a:rPr lang="en-US" dirty="0"/>
+              <a:t>	} // end for</a:t>
+            </a:r>
+          </a:p>
+          <a:p>
+            <a:pPr marL="0" indent="0">
+              <a:buNone/>
+            </a:pPr>
+            <a:r>
+              <a:rPr lang="en-US" dirty="0"/>
+              <a:t>} // end for</a:t>
+            </a:r>
           </a:p>
         </p:txBody>
       </p:sp>
     </p:spTree>
     <p:extLst>
       <p:ext uri="{BB962C8B-B14F-4D97-AF65-F5344CB8AC3E}">
-        <p14:creationId xmlns:p14="http://schemas.microsoft.com/office/powerpoint/2010/main" val="1626782504"/>
+        <p14:creationId xmlns:p14="http://schemas.microsoft.com/office/powerpoint/2010/main" val="2417768381"/>
       </p:ext>
     </p:extLst>
   </p:cSld>
   <p:clrMapOvr>
     <a:masterClrMapping/>
   </p:clrMapOvr>
+  <p:timing>
+    <p:tnLst>
+      <p:par>
+        <p:cTn id="1" dur="indefinite" restart="never" nodeType="tmRoot"/>
+      </p:par>
+    </p:tnLst>
+  </p:timing>
 </p:sld>
 </file>
 
@@ -12944,14 +13079,21 @@
             <p:ph type="title"/>
           </p:nvPr>
         </p:nvSpPr>
-        <p:spPr/>
-        <p:txBody>
-          <a:bodyPr/>
-          <a:lstStyle/>
-          <a:p>
-            <a:r>
-              <a:rPr lang="en-US" dirty="0"/>
-              <a:t>Iterate through 2D array?</a:t>
+        <p:spPr>
+          <a:xfrm>
+            <a:off x="457200" y="152400"/>
+            <a:ext cx="8229600" cy="563562"/>
+          </a:xfrm>
+        </p:spPr>
+        <p:txBody>
+          <a:bodyPr>
+            <a:normAutofit fontScale="90000"/>
+          </a:bodyPr>
+          <a:lstStyle/>
+          <a:p>
+            <a:r>
+              <a:rPr lang="en-US" dirty="0"/>
+              <a:t>Order of iteration?</a:t>
             </a:r>
           </a:p>
         </p:txBody>
@@ -12966,252 +13108,6 @@
             <p:ph idx="1"/>
           </p:nvPr>
         </p:nvSpPr>
-        <p:spPr/>
-        <p:txBody>
-          <a:bodyPr>
-            <a:normAutofit fontScale="85000" lnSpcReduction="20000"/>
-          </a:bodyPr>
-          <a:lstStyle/>
-          <a:p>
-            <a:pPr marL="0" indent="0">
-              <a:buNone/>
-            </a:pPr>
-            <a:r>
-              <a:rPr lang="en-US" dirty="0" err="1"/>
-              <a:t>int</a:t>
-            </a:r>
-            <a:r>
-              <a:rPr lang="en-US" dirty="0"/>
-              <a:t>[][] </a:t>
-            </a:r>
-            <a:r>
-              <a:rPr lang="en-US" dirty="0" err="1"/>
-              <a:t>numArray</a:t>
-            </a:r>
-            <a:r>
-              <a:rPr lang="en-US" dirty="0"/>
-              <a:t> = </a:t>
-            </a:r>
-            <a:r>
-              <a:rPr lang="en-US" b="1" dirty="0"/>
-              <a:t>new</a:t>
-            </a:r>
-            <a:r>
-              <a:rPr lang="en-US" dirty="0"/>
-              <a:t> </a:t>
-            </a:r>
-            <a:r>
-              <a:rPr lang="en-US" dirty="0" err="1"/>
-              <a:t>int</a:t>
-            </a:r>
-            <a:r>
-              <a:rPr lang="en-US" dirty="0"/>
-              <a:t>[2][4];</a:t>
-            </a:r>
-          </a:p>
-          <a:p>
-            <a:pPr marL="0" indent="0">
-              <a:buNone/>
-            </a:pPr>
-            <a:r>
-              <a:rPr lang="en-US" dirty="0" err="1"/>
-              <a:t>int</a:t>
-            </a:r>
-            <a:r>
-              <a:rPr lang="en-US" dirty="0"/>
-              <a:t> rows = </a:t>
-            </a:r>
-            <a:r>
-              <a:rPr lang="en-US" dirty="0" err="1"/>
-              <a:t>numArray.length</a:t>
-            </a:r>
-            <a:r>
-              <a:rPr lang="en-US" dirty="0"/>
-              <a:t>;</a:t>
-            </a:r>
-          </a:p>
-          <a:p>
-            <a:pPr marL="0" indent="0">
-              <a:buNone/>
-            </a:pPr>
-            <a:r>
-              <a:rPr lang="en-US" dirty="0" err="1"/>
-              <a:t>int</a:t>
-            </a:r>
-            <a:r>
-              <a:rPr lang="en-US" dirty="0"/>
-              <a:t> cols = </a:t>
-            </a:r>
-            <a:r>
-              <a:rPr lang="en-US" dirty="0" err="1"/>
-              <a:t>numArray</a:t>
-            </a:r>
-            <a:r>
-              <a:rPr lang="en-US" dirty="0"/>
-              <a:t>[0].length;</a:t>
-            </a:r>
-          </a:p>
-          <a:p>
-            <a:pPr marL="0" indent="0">
-              <a:buNone/>
-            </a:pPr>
-            <a:r>
-              <a:rPr lang="en-US" dirty="0" err="1"/>
-              <a:t>int</a:t>
-            </a:r>
-            <a:r>
-              <a:rPr lang="en-US" dirty="0"/>
-              <a:t> count = 0;</a:t>
-            </a:r>
-          </a:p>
-          <a:p>
-            <a:pPr marL="0" indent="0">
-              <a:buNone/>
-            </a:pPr>
-            <a:r>
-              <a:rPr lang="en-US" dirty="0"/>
-              <a:t>for (int r = 0; r &lt; rows; r ++ ) {</a:t>
-            </a:r>
-          </a:p>
-          <a:p>
-            <a:pPr marL="0" indent="0">
-              <a:buNone/>
-            </a:pPr>
-            <a:r>
-              <a:rPr lang="en-US" dirty="0"/>
-              <a:t>	for (int c = 0; c &lt; cols; </a:t>
-            </a:r>
-            <a:r>
-              <a:rPr lang="en-US" dirty="0" err="1"/>
-              <a:t>c++</a:t>
-            </a:r>
-            <a:r>
-              <a:rPr lang="en-US" dirty="0"/>
-              <a:t>) {</a:t>
-            </a:r>
-          </a:p>
-          <a:p>
-            <a:pPr marL="0" indent="0">
-              <a:buNone/>
-            </a:pPr>
-            <a:r>
-              <a:rPr lang="en-US" dirty="0"/>
-              <a:t>		 </a:t>
-            </a:r>
-            <a:r>
-              <a:rPr lang="en-US" dirty="0" err="1"/>
-              <a:t>numArray</a:t>
-            </a:r>
-            <a:r>
-              <a:rPr lang="en-US" dirty="0"/>
-              <a:t>[r][c] = count;</a:t>
-            </a:r>
-          </a:p>
-          <a:p>
-            <a:pPr marL="0" indent="0">
-              <a:buNone/>
-            </a:pPr>
-            <a:r>
-              <a:rPr lang="en-US" dirty="0"/>
-              <a:t>		count ++;</a:t>
-            </a:r>
-          </a:p>
-          <a:p>
-            <a:pPr marL="0" indent="0">
-              <a:buNone/>
-            </a:pPr>
-            <a:r>
-              <a:rPr lang="en-US" dirty="0"/>
-              <a:t>	} // end for</a:t>
-            </a:r>
-          </a:p>
-          <a:p>
-            <a:pPr marL="0" indent="0">
-              <a:buNone/>
-            </a:pPr>
-            <a:r>
-              <a:rPr lang="en-US" dirty="0"/>
-              <a:t>} // end for</a:t>
-            </a:r>
-          </a:p>
-        </p:txBody>
-      </p:sp>
-    </p:spTree>
-    <p:extLst>
-      <p:ext uri="{BB962C8B-B14F-4D97-AF65-F5344CB8AC3E}">
-        <p14:creationId xmlns:p14="http://schemas.microsoft.com/office/powerpoint/2010/main" val="2417768381"/>
-      </p:ext>
-    </p:extLst>
-  </p:cSld>
-  <p:clrMapOvr>
-    <a:masterClrMapping/>
-  </p:clrMapOvr>
-  <p:timing>
-    <p:tnLst>
-      <p:par>
-        <p:cTn id="1" dur="indefinite" restart="never" nodeType="tmRoot"/>
-      </p:par>
-    </p:tnLst>
-  </p:timing>
-</p:sld>
-</file>
-
-<file path=ppt/slides/slide37.xml><?xml version="1.0" encoding="utf-8"?>
-<p:sld xmlns:a="http://schemas.openxmlformats.org/drawingml/2006/main" xmlns:r="http://schemas.openxmlformats.org/officeDocument/2006/relationships" xmlns:p="http://schemas.openxmlformats.org/presentationml/2006/main">
-  <p:cSld>
-    <p:spTree>
-      <p:nvGrpSpPr>
-        <p:cNvPr id="1" name=""/>
-        <p:cNvGrpSpPr/>
-        <p:nvPr/>
-      </p:nvGrpSpPr>
-      <p:grpSpPr>
-        <a:xfrm>
-          <a:off x="0" y="0"/>
-          <a:ext cx="0" cy="0"/>
-          <a:chOff x="0" y="0"/>
-          <a:chExt cx="0" cy="0"/>
-        </a:xfrm>
-      </p:grpSpPr>
-      <p:sp>
-        <p:nvSpPr>
-          <p:cNvPr id="2" name="Title 1"/>
-          <p:cNvSpPr>
-            <a:spLocks noGrp="1"/>
-          </p:cNvSpPr>
-          <p:nvPr>
-            <p:ph type="title"/>
-          </p:nvPr>
-        </p:nvSpPr>
-        <p:spPr>
-          <a:xfrm>
-            <a:off x="457200" y="152400"/>
-            <a:ext cx="8229600" cy="563562"/>
-          </a:xfrm>
-        </p:spPr>
-        <p:txBody>
-          <a:bodyPr>
-            <a:normAutofit fontScale="90000"/>
-          </a:bodyPr>
-          <a:lstStyle/>
-          <a:p>
-            <a:r>
-              <a:rPr lang="en-US" dirty="0"/>
-              <a:t>Order of iteration?</a:t>
-            </a:r>
-          </a:p>
-        </p:txBody>
-      </p:sp>
-      <p:sp>
-        <p:nvSpPr>
-          <p:cNvPr id="3" name="Content Placeholder 2"/>
-          <p:cNvSpPr>
-            <a:spLocks noGrp="1"/>
-          </p:cNvSpPr>
-          <p:nvPr>
-            <p:ph idx="1"/>
-          </p:nvPr>
-        </p:nvSpPr>
         <p:spPr>
           <a:xfrm>
             <a:off x="76200" y="730643"/>
@@ -13355,11 +13251,7 @@
             </a:pPr>
             <a:r>
               <a:rPr lang="en-US" dirty="0"/>
-              <a:t>		</a:t>
-            </a:r>
-            <a:r>
-              <a:rPr lang="en-US" dirty="0"/>
-              <a:t> </a:t>
+              <a:t>		 </a:t>
             </a:r>
             <a:r>
               <a:rPr lang="en-US" dirty="0" err="1"/>
@@ -13367,11 +13259,7 @@
             </a:r>
             <a:r>
               <a:rPr lang="en-US" dirty="0"/>
-              <a:t>[r</a:t>
-            </a:r>
-            <a:r>
-              <a:rPr lang="en-US" dirty="0"/>
-              <a:t>][c] = count;</a:t>
+              <a:t>[r][c] = count;</a:t>
             </a:r>
           </a:p>
           <a:p>
@@ -13997,6 +13885,106 @@
       <p:bldP spid="12" grpId="0"/>
     </p:bldLst>
   </p:timing>
+</p:sld>
+</file>
+
+<file path=ppt/slides/slide37.xml><?xml version="1.0" encoding="utf-8"?>
+<p:sld xmlns:a="http://schemas.openxmlformats.org/drawingml/2006/main" xmlns:r="http://schemas.openxmlformats.org/officeDocument/2006/relationships" xmlns:p="http://schemas.openxmlformats.org/presentationml/2006/main">
+  <p:cSld>
+    <p:spTree>
+      <p:nvGrpSpPr>
+        <p:cNvPr id="1" name=""/>
+        <p:cNvGrpSpPr/>
+        <p:nvPr/>
+      </p:nvGrpSpPr>
+      <p:grpSpPr>
+        <a:xfrm>
+          <a:off x="0" y="0"/>
+          <a:ext cx="0" cy="0"/>
+          <a:chOff x="0" y="0"/>
+          <a:chExt cx="0" cy="0"/>
+        </a:xfrm>
+      </p:grpSpPr>
+      <p:sp>
+        <p:nvSpPr>
+          <p:cNvPr id="2" name="Title 1"/>
+          <p:cNvSpPr>
+            <a:spLocks noGrp="1"/>
+          </p:cNvSpPr>
+          <p:nvPr>
+            <p:ph type="title"/>
+          </p:nvPr>
+        </p:nvSpPr>
+        <p:spPr/>
+        <p:txBody>
+          <a:bodyPr/>
+          <a:lstStyle/>
+          <a:p>
+            <a:r>
+              <a:rPr lang="en-US" dirty="0"/>
+              <a:t>2D Arrays</a:t>
+            </a:r>
+          </a:p>
+        </p:txBody>
+      </p:sp>
+      <p:sp>
+        <p:nvSpPr>
+          <p:cNvPr id="3" name="Content Placeholder 2"/>
+          <p:cNvSpPr>
+            <a:spLocks noGrp="1"/>
+          </p:cNvSpPr>
+          <p:nvPr>
+            <p:ph idx="1"/>
+          </p:nvPr>
+        </p:nvSpPr>
+        <p:spPr/>
+        <p:txBody>
+          <a:bodyPr>
+            <a:normAutofit lnSpcReduction="10000"/>
+          </a:bodyPr>
+          <a:lstStyle/>
+          <a:p>
+            <a:r>
+              <a:rPr lang="en-US" dirty="0"/>
+              <a:t>Make groups of two (no more than 3, no one can work alone)</a:t>
+            </a:r>
+          </a:p>
+          <a:p>
+            <a:r>
+              <a:rPr lang="en-US" dirty="0"/>
+              <a:t>Read through the 3 2D Array sample problems with your partner and make sure you both understand how they work</a:t>
+            </a:r>
+          </a:p>
+          <a:p>
+            <a:r>
+              <a:rPr lang="en-US" dirty="0"/>
+              <a:t>Then use the code as an example to answer the 2D Array quiz questions</a:t>
+            </a:r>
+          </a:p>
+          <a:p>
+            <a:r>
+              <a:rPr lang="en-US" dirty="0"/>
+              <a:t>Then do the 2d sample problems</a:t>
+            </a:r>
+          </a:p>
+          <a:p>
+            <a:r>
+              <a:rPr lang="en-US" dirty="0"/>
+              <a:t>Call me over when you’re finished</a:t>
+            </a:r>
+          </a:p>
+        </p:txBody>
+      </p:sp>
+    </p:spTree>
+    <p:extLst>
+      <p:ext uri="{BB962C8B-B14F-4D97-AF65-F5344CB8AC3E}">
+        <p14:creationId xmlns:p14="http://schemas.microsoft.com/office/powerpoint/2010/main" val="2522096617"/>
+      </p:ext>
+    </p:extLst>
+  </p:cSld>
+  <p:clrMapOvr>
+    <a:masterClrMapping/>
+  </p:clrMapOvr>
 </p:sld>
 </file>
 
@@ -15476,9 +15464,6 @@
               </a:rPr>
               <a:t>("JP").add( "Jason"    );</a:t>
             </a:r>
-            <a:endParaRPr lang="en-US" sz="2400" dirty="0">
-              <a:latin typeface="Consolas" panose="020B0609020204030204" pitchFamily="49" charset="0"/>
-            </a:endParaRPr>
           </a:p>
           <a:p>
             <a:pPr marL="0" indent="0">
@@ -15883,9 +15868,6 @@
               </a:rPr>
               <a:t>-&gt;</a:t>
             </a:r>
-            <a:endParaRPr lang="en-US" sz="2400" dirty="0">
-              <a:latin typeface="Consolas" panose="020B0609020204030204" pitchFamily="49" charset="0"/>
-            </a:endParaRPr>
           </a:p>
         </p:txBody>
       </p:sp>
@@ -17458,7 +17440,7 @@
           </a:ln>
           <a:extLst>
             <a:ext uri="{C572A759-6A51-4108-AA02-DFA0A04FC94B}">
-              <ma14:wrappingTextBoxFlag xmlns="" xmlns:ma14="http://schemas.microsoft.com/office/mac/drawingml/2011/main" val="1"/>
+              <ma14:wrappingTextBoxFlag xmlns:ma14="http://schemas.microsoft.com/office/mac/drawingml/2011/main" xmlns="" val="1"/>
             </a:ext>
           </a:extLst>
         </p:spPr>

</xml_diff>

<commit_message>
Update Slide #1 - today's git
</commit_message>
<xml_diff>
--- a/ClassMaterials/2DArraysAndMaps/Slides/2D Arrays and Maps.pptx
+++ b/ClassMaterials/2DArraysAndMaps/Slides/2D Arrays and Maps.pptx
@@ -206,6 +206,9 @@
         </p15:guide>
       </p15:sldGuideLst>
     </p:ext>
+    <p:ext uri="{2D200454-40CA-4A62-9FC3-DE9A4176ACB9}">
+      <p15:notesGuideLst xmlns:p15="http://schemas.microsoft.com/office/powerpoint/2012/main"/>
+    </p:ext>
   </p:extLst>
 </p:presentation>
 </file>
@@ -339,7 +342,7 @@
               <a:pPr>
                 <a:defRPr/>
               </a:pPr>
-              <a:t>3/12/2020</a:t>
+              <a:t>2/24/22</a:t>
             </a:fld>
             <a:endParaRPr lang="en-US"/>
           </a:p>
@@ -574,7 +577,7 @@
               <a:pPr>
                 <a:defRPr/>
               </a:pPr>
-              <a:t>3/12/2020</a:t>
+              <a:t>2/24/22</a:t>
             </a:fld>
             <a:endParaRPr lang="en-US"/>
           </a:p>
@@ -981,14 +984,14 @@
               </a:spcBef>
             </a:pPr>
             <a:r>
-              <a:rPr lang="en-US" dirty="0" smtClean="0"/>
+              <a:rPr lang="en-US" dirty="0"/>
               <a:t>Note: You will want to use clicker for slides</a:t>
             </a:r>
             <a:r>
-              <a:rPr lang="en-US" baseline="0" dirty="0" smtClean="0"/>
+              <a:rPr lang="en-US" baseline="0" dirty="0"/>
               <a:t> today!</a:t>
             </a:r>
-            <a:endParaRPr lang="en-US" dirty="0" smtClean="0"/>
+            <a:endParaRPr lang="en-US" dirty="0"/>
           </a:p>
           <a:p>
             <a:pPr eaLnBrk="1" hangingPunct="1">
@@ -996,7 +999,7 @@
                 <a:spcPct val="0"/>
               </a:spcBef>
             </a:pPr>
-            <a:endParaRPr lang="en-US" dirty="0" smtClean="0"/>
+            <a:endParaRPr lang="en-US" dirty="0"/>
           </a:p>
           <a:p>
             <a:pPr eaLnBrk="1" hangingPunct="1">
@@ -1005,11 +1008,11 @@
               </a:spcBef>
             </a:pPr>
             <a:r>
-              <a:rPr lang="en-US" dirty="0" smtClean="0"/>
+              <a:rPr lang="en-US" dirty="0"/>
               <a:t>Bring hard copy of code from 2DArraysAndMapsS</a:t>
             </a:r>
             <a:r>
-              <a:rPr lang="en-US" baseline="0" dirty="0" smtClean="0"/>
+              <a:rPr lang="en-US" baseline="0" dirty="0"/>
               <a:t>olution.</a:t>
             </a:r>
           </a:p>
@@ -1020,7 +1023,7 @@
               </a:spcBef>
             </a:pPr>
             <a:r>
-              <a:rPr lang="en-US" baseline="0" dirty="0" smtClean="0"/>
+              <a:rPr lang="en-US" baseline="0" dirty="0"/>
               <a:t>Bring copies of 2DArraysAndMapsSamples from Instructor Resources.</a:t>
             </a:r>
           </a:p>
@@ -1048,7 +1051,7 @@
               <a:pPr/>
               <a:t>1</a:t>
             </a:fld>
-            <a:endParaRPr lang="en-US" smtClean="0"/>
+            <a:endParaRPr lang="en-US"/>
           </a:p>
         </p:txBody>
       </p:sp>
@@ -1364,35 +1367,35 @@
           <a:lstStyle/>
           <a:p>
             <a:r>
-              <a:rPr lang="en-US" dirty="0" smtClean="0"/>
+              <a:rPr lang="en-US" dirty="0"/>
               <a:t>What does</a:t>
             </a:r>
             <a:r>
-              <a:rPr lang="en-US" baseline="0" dirty="0" smtClean="0"/>
+              <a:rPr lang="en-US" baseline="0" dirty="0"/>
               <a:t> it mean when I write down?</a:t>
             </a:r>
           </a:p>
           <a:p>
             <a:r>
-              <a:rPr lang="en-US" baseline="0" dirty="0" err="1" smtClean="0"/>
+              <a:rPr lang="en-US" baseline="0" dirty="0" err="1"/>
               <a:t>int</a:t>
             </a:r>
             <a:r>
-              <a:rPr lang="en-US" baseline="0" dirty="0" smtClean="0"/>
+              <a:rPr lang="en-US" baseline="0" dirty="0"/>
               <a:t>[]      (an array of type </a:t>
             </a:r>
             <a:r>
-              <a:rPr lang="en-US" baseline="0" dirty="0" err="1" smtClean="0"/>
+              <a:rPr lang="en-US" baseline="0" dirty="0" err="1"/>
               <a:t>int</a:t>
             </a:r>
             <a:r>
-              <a:rPr lang="en-US" baseline="0" dirty="0" smtClean="0"/>
+              <a:rPr lang="en-US" baseline="0" dirty="0"/>
               <a:t>)</a:t>
             </a:r>
           </a:p>
           <a:p>
             <a:r>
-              <a:rPr lang="en-US" baseline="0" dirty="0" smtClean="0"/>
+              <a:rPr lang="en-US" baseline="0" dirty="0"/>
               <a:t>OR</a:t>
             </a:r>
           </a:p>
@@ -1415,7 +1418,7 @@
               <a:defRPr/>
             </a:pPr>
             <a:r>
-              <a:rPr lang="en-US" baseline="0" dirty="0" smtClean="0"/>
+              <a:rPr lang="en-US" baseline="0" dirty="0"/>
               <a:t>___[]      (an array of some? type )</a:t>
             </a:r>
           </a:p>
@@ -1437,7 +1440,7 @@
               <a:tabLst/>
               <a:defRPr/>
             </a:pPr>
-            <a:endParaRPr lang="en-US" baseline="0" dirty="0" smtClean="0"/>
+            <a:endParaRPr lang="en-US" baseline="0" dirty="0"/>
           </a:p>
           <a:p>
             <a:pPr marL="0" marR="0" lvl="0" indent="0" algn="l" defTabSz="914400" rtl="0" eaLnBrk="0" fontAlgn="base" latinLnBrk="0" hangingPunct="0">
@@ -1458,15 +1461,15 @@
               <a:defRPr/>
             </a:pPr>
             <a:r>
-              <a:rPr lang="en-US" baseline="0" dirty="0" smtClean="0"/>
+              <a:rPr lang="en-US" baseline="0" dirty="0"/>
               <a:t>Is </a:t>
             </a:r>
             <a:r>
-              <a:rPr lang="en-US" baseline="0" dirty="0" err="1" smtClean="0"/>
+              <a:rPr lang="en-US" baseline="0" dirty="0" err="1"/>
               <a:t>int</a:t>
             </a:r>
             <a:r>
-              <a:rPr lang="en-US" baseline="0" dirty="0" smtClean="0"/>
+              <a:rPr lang="en-US" baseline="0" dirty="0"/>
               <a:t>[] a type?    yes</a:t>
             </a:r>
           </a:p>
@@ -1488,7 +1491,7 @@
               <a:tabLst/>
               <a:defRPr/>
             </a:pPr>
-            <a:endParaRPr lang="en-US" baseline="0" dirty="0" smtClean="0"/>
+            <a:endParaRPr lang="en-US" baseline="0" dirty="0"/>
           </a:p>
           <a:p>
             <a:pPr marL="0" marR="0" lvl="0" indent="0" algn="l" defTabSz="914400" rtl="0" eaLnBrk="0" fontAlgn="base" latinLnBrk="0" hangingPunct="0">
@@ -1509,7 +1512,7 @@
               <a:defRPr/>
             </a:pPr>
             <a:r>
-              <a:rPr lang="en-US" baseline="0" dirty="0" smtClean="0"/>
+              <a:rPr lang="en-US" baseline="0" dirty="0"/>
               <a:t>What is does this mean?</a:t>
             </a:r>
           </a:p>
@@ -1532,27 +1535,27 @@
               <a:defRPr/>
             </a:pPr>
             <a:r>
-              <a:rPr lang="en-US" baseline="0" dirty="0" err="1" smtClean="0"/>
+              <a:rPr lang="en-US" baseline="0" dirty="0" err="1"/>
               <a:t>int</a:t>
             </a:r>
             <a:r>
-              <a:rPr lang="en-US" baseline="0" dirty="0" smtClean="0"/>
+              <a:rPr lang="en-US" baseline="0" dirty="0"/>
               <a:t>[][]    (an array of </a:t>
             </a:r>
             <a:r>
-              <a:rPr lang="en-US" baseline="0" dirty="0" err="1" smtClean="0"/>
+              <a:rPr lang="en-US" baseline="0" dirty="0" err="1"/>
               <a:t>int</a:t>
             </a:r>
             <a:r>
-              <a:rPr lang="en-US" baseline="0" dirty="0" smtClean="0"/>
+              <a:rPr lang="en-US" baseline="0" dirty="0"/>
               <a:t> arrays!)</a:t>
             </a:r>
           </a:p>
           <a:p>
-            <a:endParaRPr lang="en-US" baseline="0" dirty="0" smtClean="0"/>
-          </a:p>
-          <a:p>
-            <a:endParaRPr lang="en-US" baseline="0" dirty="0" smtClean="0"/>
+            <a:endParaRPr lang="en-US" baseline="0" dirty="0"/>
+          </a:p>
+          <a:p>
+            <a:endParaRPr lang="en-US" baseline="0" dirty="0"/>
           </a:p>
           <a:p>
             <a:endParaRPr lang="en-US" dirty="0"/>
@@ -2886,69 +2889,64 @@
           <a:lstStyle/>
           <a:p>
             <a:r>
-              <a:rPr lang="en-US" dirty="0" smtClean="0"/>
+              <a:rPr lang="en-US" dirty="0"/>
               <a:t>Emphasize to the students that if they feel overwhelmed they are not alone!</a:t>
             </a:r>
           </a:p>
           <a:p>
-            <a:endParaRPr lang="en-US" dirty="0" smtClean="0"/>
-          </a:p>
-          <a:p>
-            <a:r>
-              <a:rPr lang="en-US" dirty="0" smtClean="0"/>
+            <a:endParaRPr lang="en-US" dirty="0"/>
+          </a:p>
+          <a:p>
+            <a:r>
+              <a:rPr lang="en-US" dirty="0"/>
               <a:t>Remind them to ask questions and that as a class we can go slower if we need to.</a:t>
             </a:r>
           </a:p>
           <a:p>
             <a:r>
-              <a:rPr lang="en-US" dirty="0" smtClean="0"/>
+              <a:rPr lang="en-US" dirty="0"/>
               <a:t>As a rule: students really struggle with the enhanced for loop, if there are no questions, people may be scared to ask.</a:t>
             </a:r>
           </a:p>
           <a:p>
-            <a:endParaRPr lang="en-US" dirty="0" smtClean="0"/>
-          </a:p>
-          <a:p>
-            <a:r>
-              <a:rPr lang="en-US" dirty="0" smtClean="0"/>
+            <a:endParaRPr lang="en-US" dirty="0"/>
+          </a:p>
+          <a:p>
+            <a:r>
+              <a:rPr lang="en-US" dirty="0"/>
               <a:t>Other topics student</a:t>
             </a:r>
             <a:r>
-              <a:rPr lang="en-US" baseline="0" dirty="0" smtClean="0"/>
+              <a:rPr lang="en-US" baseline="0" dirty="0"/>
               <a:t> are likely to be confused at this point:</a:t>
             </a:r>
-            <a:endParaRPr lang="en-US" dirty="0" smtClean="0"/>
-          </a:p>
-          <a:p>
-            <a:endParaRPr lang="en-US" dirty="0" smtClean="0"/>
-          </a:p>
-          <a:p>
-            <a:r>
-              <a:rPr lang="en-US" dirty="0" smtClean="0"/>
+            <a:endParaRPr lang="en-US" dirty="0"/>
+          </a:p>
+          <a:p>
+            <a:endParaRPr lang="en-US" dirty="0"/>
+          </a:p>
+          <a:p>
+            <a:r>
+              <a:rPr lang="en-US" dirty="0"/>
               <a:t>different between primitives and classes/objects</a:t>
             </a:r>
           </a:p>
           <a:p>
             <a:r>
-              <a:rPr lang="en-US" dirty="0" smtClean="0"/>
+              <a:rPr lang="en-US" dirty="0"/>
               <a:t>the idea that memory stores information somewhere and it effectively is an address (null) for objects</a:t>
             </a:r>
           </a:p>
           <a:p>
             <a:r>
-              <a:rPr lang="en-US" dirty="0" smtClean="0"/>
+              <a:rPr lang="en-US" dirty="0"/>
               <a:t>public vs. private:   could create a little demo class (Person) to show getter and setters with private/public variables (name)   </a:t>
             </a:r>
-            <a:endParaRPr lang="en-US" dirty="0" smtClean="0"/>
-          </a:p>
-          <a:p>
-            <a:r>
-              <a:rPr lang="en-US" dirty="0" smtClean="0"/>
-              <a:t>Person </a:t>
-            </a:r>
-            <a:r>
-              <a:rPr lang="en-US" dirty="0" smtClean="0"/>
-              <a:t>p1 = new Person(“Jason”);     p1.name   p1.getName()</a:t>
+          </a:p>
+          <a:p>
+            <a:r>
+              <a:rPr lang="en-US" dirty="0"/>
+              <a:t>Person p1 = new Person(“Jason”);     p1.name   p1.getName()</a:t>
             </a:r>
           </a:p>
           <a:p>
@@ -3283,16 +3281,12 @@
               <a:t>Unlimited help with Eclipse </a:t>
             </a:r>
             <a:r>
-              <a:rPr lang="en-US" baseline="0" dirty="0" err="1" smtClean="0"/>
+              <a:rPr lang="en-US" baseline="0" dirty="0" err="1"/>
               <a:t>Git</a:t>
             </a:r>
             <a:r>
-              <a:rPr lang="en-US" baseline="0" dirty="0" smtClean="0"/>
-              <a:t> </a:t>
-            </a:r>
-            <a:r>
               <a:rPr lang="en-US" baseline="0" dirty="0"/>
-              <a:t>tools </a:t>
+              <a:t> tools </a:t>
             </a:r>
             <a:r>
               <a:rPr lang="en-US" baseline="0" dirty="0" err="1"/>
@@ -3392,25 +3386,24 @@
           <a:lstStyle/>
           <a:p>
             <a:r>
-              <a:rPr lang="en-US" dirty="0" smtClean="0"/>
+              <a:rPr lang="en-US" dirty="0"/>
               <a:t>Make them ask questions (at least one) about academic honesty policy before moving on</a:t>
             </a:r>
           </a:p>
           <a:p>
-            <a:endParaRPr lang="en-US" dirty="0" smtClean="0"/>
-          </a:p>
-          <a:p>
-            <a:r>
-              <a:rPr lang="en-US" dirty="0" smtClean="0"/>
+            <a:endParaRPr lang="en-US" dirty="0"/>
+          </a:p>
+          <a:p>
+            <a:r>
+              <a:rPr lang="en-US" dirty="0"/>
               <a:t>Explain the reasoning behind the academic honesty policy:</a:t>
             </a:r>
           </a:p>
           <a:p>
             <a:r>
-              <a:rPr lang="en-US" dirty="0" smtClean="0"/>
+              <a:rPr lang="en-US" dirty="0"/>
               <a:t>Students need to learn competency, too much help does not prepare them for future courses or career</a:t>
             </a:r>
-            <a:endParaRPr lang="en-US" dirty="0"/>
           </a:p>
         </p:txBody>
       </p:sp>
@@ -3734,7 +3727,7 @@
               <a:pPr>
                 <a:defRPr/>
               </a:pPr>
-              <a:t>Thursday, March 12, 2020</a:t>
+              <a:t>Thursday, February 24, 2022</a:t>
             </a:fld>
             <a:endParaRPr lang="en-US" dirty="0"/>
           </a:p>
@@ -3917,7 +3910,7 @@
               <a:pPr>
                 <a:defRPr/>
               </a:pPr>
-              <a:t>Thursday, March 12, 2020</a:t>
+              <a:t>Thursday, February 24, 2022</a:t>
             </a:fld>
             <a:endParaRPr lang="en-US" dirty="0"/>
           </a:p>
@@ -4110,7 +4103,7 @@
               <a:pPr>
                 <a:defRPr/>
               </a:pPr>
-              <a:t>Thursday, March 12, 2020</a:t>
+              <a:t>Thursday, February 24, 2022</a:t>
             </a:fld>
             <a:endParaRPr lang="en-US" dirty="0"/>
           </a:p>
@@ -4293,7 +4286,7 @@
               <a:pPr>
                 <a:defRPr/>
               </a:pPr>
-              <a:t>Thursday, March 12, 2020</a:t>
+              <a:t>Thursday, February 24, 2022</a:t>
             </a:fld>
             <a:endParaRPr lang="en-US" dirty="0"/>
           </a:p>
@@ -4553,7 +4546,7 @@
               <a:pPr>
                 <a:defRPr/>
               </a:pPr>
-              <a:t>Thursday, March 12, 2020</a:t>
+              <a:t>Thursday, February 24, 2022</a:t>
             </a:fld>
             <a:endParaRPr lang="en-US"/>
           </a:p>
@@ -4853,7 +4846,7 @@
               <a:pPr>
                 <a:defRPr/>
               </a:pPr>
-              <a:t>Thursday, March 12, 2020</a:t>
+              <a:t>Thursday, February 24, 2022</a:t>
             </a:fld>
             <a:endParaRPr lang="en-US"/>
           </a:p>
@@ -5287,7 +5280,7 @@
               <a:pPr>
                 <a:defRPr/>
               </a:pPr>
-              <a:t>Thursday, March 12, 2020</a:t>
+              <a:t>Thursday, February 24, 2022</a:t>
             </a:fld>
             <a:endParaRPr lang="en-US"/>
           </a:p>
@@ -5419,7 +5412,7 @@
               <a:pPr>
                 <a:defRPr/>
               </a:pPr>
-              <a:t>Thursday, March 12, 2020</a:t>
+              <a:t>Thursday, February 24, 2022</a:t>
             </a:fld>
             <a:endParaRPr lang="en-US"/>
           </a:p>
@@ -5529,7 +5522,7 @@
               <a:pPr>
                 <a:defRPr/>
               </a:pPr>
-              <a:t>Thursday, March 12, 2020</a:t>
+              <a:t>Thursday, February 24, 2022</a:t>
             </a:fld>
             <a:endParaRPr lang="en-US" dirty="0"/>
           </a:p>
@@ -5819,7 +5812,7 @@
               <a:pPr>
                 <a:defRPr/>
               </a:pPr>
-              <a:t>Thursday, March 12, 2020</a:t>
+              <a:t>Thursday, February 24, 2022</a:t>
             </a:fld>
             <a:endParaRPr lang="en-US"/>
           </a:p>
@@ -6086,7 +6079,7 @@
               <a:pPr>
                 <a:defRPr/>
               </a:pPr>
-              <a:t>Thursday, March 12, 2020</a:t>
+              <a:t>Thursday, February 24, 2022</a:t>
             </a:fld>
             <a:endParaRPr lang="en-US"/>
           </a:p>
@@ -6312,7 +6305,7 @@
               <a:pPr>
                 <a:defRPr/>
               </a:pPr>
-              <a:t>Thursday, March 12, 2020</a:t>
+              <a:t>Thursday, February 24, 2022</a:t>
             </a:fld>
             <a:endParaRPr lang="en-US" dirty="0"/>
           </a:p>
@@ -6712,10 +6705,9 @@
           <a:lstStyle/>
           <a:p>
             <a:r>
-              <a:rPr lang="en-US" dirty="0" smtClean="0"/>
+              <a:rPr lang="en-US" dirty="0"/>
               <a:t>CSSE 220</a:t>
             </a:r>
-            <a:endParaRPr lang="en-US" dirty="0"/>
           </a:p>
         </p:txBody>
       </p:sp>
@@ -6729,13 +6721,18 @@
             <p:ph type="subTitle" idx="1"/>
           </p:nvPr>
         </p:nvSpPr>
-        <p:spPr/>
+        <p:spPr>
+          <a:xfrm>
+            <a:off x="1371600" y="3886200"/>
+            <a:ext cx="6400800" cy="838200"/>
+          </a:xfrm>
+        </p:spPr>
         <p:txBody>
           <a:bodyPr/>
           <a:lstStyle/>
           <a:p>
             <a:r>
-              <a:rPr lang="en-US" dirty="0" smtClean="0"/>
+              <a:rPr lang="en-US" dirty="0"/>
               <a:t>2D Arrays and Maps</a:t>
             </a:r>
           </a:p>
@@ -6749,12 +6746,15 @@
         </p:nvSpPr>
         <p:spPr>
           <a:xfrm>
-            <a:off x="228600" y="6096000"/>
-            <a:ext cx="8534400" cy="609600"/>
+            <a:off x="228600" y="4876800"/>
+            <a:ext cx="8534400" cy="1295400"/>
           </a:xfrm>
           <a:prstGeom prst="rect">
             <a:avLst/>
           </a:prstGeom>
+          <a:solidFill>
+            <a:schemeClr val="accent3"/>
+          </a:solidFill>
         </p:spPr>
         <p:style>
           <a:lnRef idx="2">
@@ -6776,20 +6776,50 @@
           <a:bodyPr rtlCol="0" anchor="ctr"/>
           <a:lstStyle/>
           <a:p>
-            <a:pPr algn="ctr"/>
-            <a:r>
-              <a:rPr lang="en-US" sz="2400" dirty="0"/>
-              <a:t>Check out </a:t>
-            </a:r>
-            <a:r>
-              <a:rPr lang="en-US" sz="2400" dirty="0" smtClean="0"/>
-              <a:t>2DArraysAndMapsInClass from </a:t>
-            </a:r>
-            <a:r>
-              <a:rPr lang="en-US" sz="2400" dirty="0" err="1" smtClean="0"/>
-              <a:t>Git</a:t>
-            </a:r>
-            <a:endParaRPr lang="en-US" sz="2400" dirty="0"/>
+            <a:r>
+              <a:rPr lang="en-US" sz="2400" dirty="0">
+                <a:solidFill>
+                  <a:srgbClr val="FFFFFF"/>
+                </a:solidFill>
+              </a:rPr>
+              <a:t>The </a:t>
+            </a:r>
+            <a:r>
+              <a:rPr lang="en-US" sz="2400" i="1" dirty="0">
+                <a:solidFill>
+                  <a:srgbClr val="FFFFFF"/>
+                </a:solidFill>
+              </a:rPr>
+              <a:t>git</a:t>
+            </a:r>
+            <a:r>
+              <a:rPr lang="en-US" sz="2400" dirty="0">
+                <a:solidFill>
+                  <a:srgbClr val="FFFFFF"/>
+                </a:solidFill>
+              </a:rPr>
+              <a:t> projects for today are:</a:t>
+            </a:r>
+          </a:p>
+          <a:p>
+            <a:pPr marL="342900" indent="-342900">
+              <a:buFont typeface="Arial" panose="020B0604020202020204" pitchFamily="34" charset="0"/>
+              <a:buChar char="•"/>
+            </a:pPr>
+            <a:r>
+              <a:rPr lang="en-US" sz="2400" i="1" dirty="0"/>
+              <a:t>Practice2DArraysAndMaps</a:t>
+            </a:r>
+          </a:p>
+          <a:p>
+            <a:pPr marL="342900" indent="-342900">
+              <a:buFont typeface="Arial" panose="020B0604020202020204" pitchFamily="34" charset="0"/>
+              <a:buChar char="•"/>
+            </a:pPr>
+            <a:r>
+              <a:rPr lang="en-US" sz="2400" i="1" dirty="0"/>
+              <a:t>Practice2DArraysAndMapsSolution</a:t>
+            </a:r>
           </a:p>
         </p:txBody>
       </p:sp>
@@ -6803,13 +6833,6 @@
   <p:clrMapOvr>
     <a:masterClrMapping/>
   </p:clrMapOvr>
-  <p:timing>
-    <p:tnLst>
-      <p:par>
-        <p:cTn id="1" dur="indefinite" restart="never" nodeType="tmRoot"/>
-      </p:par>
-    </p:tnLst>
-  </p:timing>
 </p:sld>
 </file>
 
@@ -7306,13 +7329,6 @@
   <p:clrMapOvr>
     <a:masterClrMapping/>
   </p:clrMapOvr>
-  <p:timing>
-    <p:tnLst>
-      <p:par>
-        <p:cTn id="1" dur="indefinite" restart="never" nodeType="tmRoot"/>
-      </p:par>
-    </p:tnLst>
-  </p:timing>
 </p:sld>
 </file>
 
@@ -7439,13 +7455,6 @@
   <p:clrMapOvr>
     <a:masterClrMapping/>
   </p:clrMapOvr>
-  <p:timing>
-    <p:tnLst>
-      <p:par>
-        <p:cTn id="1" dur="indefinite" restart="never" nodeType="tmRoot"/>
-      </p:par>
-    </p:tnLst>
-  </p:timing>
 </p:sld>
 </file>
 
@@ -7492,7 +7501,6 @@
               <a:rPr lang="en-US" dirty="0"/>
               <a:t>Questions about Academic Integrity Policy</a:t>
             </a:r>
-            <a:endParaRPr lang="en-US" dirty="0"/>
           </a:p>
         </p:txBody>
       </p:sp>
@@ -7512,37 +7520,36 @@
           <a:lstStyle/>
           <a:p>
             <a:r>
-              <a:rPr lang="en-US" dirty="0" smtClean="0"/>
+              <a:rPr lang="en-US" dirty="0"/>
               <a:t>Please post questions to Piazza relating to academic honesty</a:t>
             </a:r>
           </a:p>
           <a:p>
             <a:r>
-              <a:rPr lang="en-US" dirty="0" smtClean="0"/>
+              <a:rPr lang="en-US" dirty="0"/>
               <a:t>For example:</a:t>
             </a:r>
           </a:p>
           <a:p>
             <a:pPr lvl="1"/>
             <a:r>
-              <a:rPr lang="en-US" dirty="0" smtClean="0"/>
+              <a:rPr lang="en-US" dirty="0"/>
               <a:t>Is it OK if I do ___?</a:t>
             </a:r>
           </a:p>
           <a:p>
             <a:pPr lvl="1"/>
             <a:r>
-              <a:rPr lang="en-US" dirty="0" smtClean="0"/>
+              <a:rPr lang="en-US" dirty="0"/>
               <a:t>Why are we not allowed to do ___?</a:t>
             </a:r>
           </a:p>
           <a:p>
             <a:pPr lvl="1"/>
             <a:r>
-              <a:rPr lang="en-US" dirty="0" smtClean="0"/>
+              <a:rPr lang="en-US" dirty="0"/>
               <a:t>What should I do if ____?</a:t>
             </a:r>
-            <a:endParaRPr lang="en-US" dirty="0"/>
           </a:p>
         </p:txBody>
       </p:sp>
@@ -7556,13 +7563,6 @@
   <p:clrMapOvr>
     <a:masterClrMapping/>
   </p:clrMapOvr>
-  <p:timing>
-    <p:tnLst>
-      <p:par>
-        <p:cTn id="1" dur="indefinite" restart="never" nodeType="tmRoot"/>
-      </p:par>
-    </p:tnLst>
-  </p:timing>
 </p:sld>
 </file>
 
@@ -7624,21 +7624,13 @@
           <a:p>
             <a:r>
               <a:rPr lang="en-US" strike="sngStrike" dirty="0"/>
-              <a:t>Questions: Post to </a:t>
-            </a:r>
-            <a:r>
-              <a:rPr lang="en-US" strike="sngStrike" dirty="0" smtClean="0"/>
-              <a:t>Piazza</a:t>
-            </a:r>
-          </a:p>
-          <a:p>
-            <a:r>
-              <a:rPr lang="en-US" strike="sngStrike" dirty="0" smtClean="0"/>
-              <a:t>Academic </a:t>
-            </a:r>
+              <a:t>Questions: Post to Piazza</a:t>
+            </a:r>
+          </a:p>
+          <a:p>
             <a:r>
               <a:rPr lang="en-US" strike="sngStrike" dirty="0"/>
-              <a:t>Honesty</a:t>
+              <a:t>Academic Honesty</a:t>
             </a:r>
           </a:p>
           <a:p>
@@ -7649,18 +7641,18 @@
           </a:p>
           <a:p>
             <a:r>
-              <a:rPr lang="en-US" dirty="0" smtClean="0"/>
+              <a:rPr lang="en-US" dirty="0"/>
               <a:t>Review:</a:t>
             </a:r>
           </a:p>
           <a:p>
             <a:pPr lvl="1"/>
             <a:r>
-              <a:rPr lang="en-US" dirty="0" smtClean="0"/>
+              <a:rPr lang="en-US" dirty="0"/>
               <a:t>Coding </a:t>
             </a:r>
             <a:r>
-              <a:rPr lang="en-US" dirty="0" err="1" smtClean="0"/>
+              <a:rPr lang="en-US" dirty="0" err="1"/>
               <a:t>Gotchas</a:t>
             </a:r>
             <a:endParaRPr lang="en-US" dirty="0"/>
@@ -7696,13 +7688,6 @@
   <p:clrMapOvr>
     <a:masterClrMapping/>
   </p:clrMapOvr>
-  <p:timing>
-    <p:tnLst>
-      <p:par>
-        <p:cTn id="1" dur="indefinite" restart="never" nodeType="tmRoot"/>
-      </p:par>
-    </p:tnLst>
-  </p:timing>
 </p:sld>
 </file>
 
@@ -7944,13 +7929,6 @@
   <p:clrMapOvr>
     <a:masterClrMapping/>
   </p:clrMapOvr>
-  <p:timing>
-    <p:tnLst>
-      <p:par>
-        <p:cTn id="1" dur="indefinite" restart="never" nodeType="tmRoot"/>
-      </p:par>
-    </p:tnLst>
-  </p:timing>
 </p:sld>
 </file>
 
@@ -8110,13 +8088,6 @@
   <p:clrMapOvr>
     <a:masterClrMapping/>
   </p:clrMapOvr>
-  <p:timing>
-    <p:tnLst>
-      <p:par>
-        <p:cTn id="1" dur="indefinite" restart="never" nodeType="tmRoot"/>
-      </p:par>
-    </p:tnLst>
-  </p:timing>
 </p:sld>
 </file>
 
@@ -8209,7 +8180,7 @@
               <a:rPr sz="3200" dirty="0"/>
             </a:br>
             <a:r>
-              <a:rPr sz="2400" b="1" dirty="0" smtClean="0">
+              <a:rPr sz="2400" b="1" dirty="0">
                 <a:solidFill>
                   <a:srgbClr val="4F81BD"/>
                 </a:solidFill>
@@ -8221,7 +8192,7 @@
               <a:t>double</a:t>
             </a:r>
             <a:r>
-              <a:rPr lang="en-US" sz="2400" b="1" dirty="0" smtClean="0">
+              <a:rPr lang="en-US" sz="2400" b="1" dirty="0">
                 <a:solidFill>
                   <a:srgbClr val="4F81BD"/>
                 </a:solidFill>
@@ -8233,18 +8204,6 @@
               <a:t>[]</a:t>
             </a:r>
             <a:r>
-              <a:rPr sz="2400" b="1" dirty="0" smtClean="0">
-                <a:solidFill>
-                  <a:srgbClr val="4F81BD"/>
-                </a:solidFill>
-                <a:latin typeface="Consolas"/>
-                <a:ea typeface="Consolas"/>
-                <a:cs typeface="Consolas"/>
-                <a:sym typeface="Consolas"/>
-              </a:rPr>
-              <a:t> scores </a:t>
-            </a:r>
-            <a:r>
               <a:rPr sz="2400" b="1" dirty="0">
                 <a:solidFill>
                   <a:srgbClr val="4F81BD"/>
@@ -8254,7 +8213,7 @@
                 <a:cs typeface="Consolas"/>
                 <a:sym typeface="Consolas"/>
               </a:rPr>
-              <a:t>= …</a:t>
+              <a:t> scores = …</a:t>
             </a:r>
             <a:br>
               <a:rPr sz="2400" b="1" dirty="0">
@@ -8510,7 +8469,7 @@
               <a:rPr sz="3200" dirty="0"/>
             </a:br>
             <a:r>
-              <a:rPr sz="2400" b="1" dirty="0" smtClean="0">
+              <a:rPr sz="2400" b="1" dirty="0">
                 <a:solidFill>
                   <a:srgbClr val="9BBB59"/>
                 </a:solidFill>
@@ -8522,7 +8481,7 @@
               <a:t>double</a:t>
             </a:r>
             <a:r>
-              <a:rPr lang="en-US" sz="2400" b="1" dirty="0" smtClean="0">
+              <a:rPr lang="en-US" sz="2400" b="1" dirty="0">
                 <a:solidFill>
                   <a:srgbClr val="9BBB59"/>
                 </a:solidFill>
@@ -8534,7 +8493,7 @@
               <a:t>[]</a:t>
             </a:r>
             <a:r>
-              <a:rPr sz="2400" b="1" dirty="0" smtClean="0">
+              <a:rPr sz="2400" b="1" dirty="0">
                 <a:solidFill>
                   <a:srgbClr val="9BBB59"/>
                 </a:solidFill>
@@ -8546,7 +8505,7 @@
               <a:t> </a:t>
             </a:r>
             <a:r>
-              <a:rPr sz="2400" b="1" dirty="0" smtClean="0">
+              <a:rPr sz="2400" b="1" dirty="0">
                 <a:solidFill>
                   <a:srgbClr val="C3D69B"/>
                 </a:solidFill>
@@ -8558,18 +8517,6 @@
               <a:t>scores</a:t>
             </a:r>
             <a:r>
-              <a:rPr sz="2400" b="1" dirty="0" smtClean="0">
-                <a:solidFill>
-                  <a:srgbClr val="9BBB59"/>
-                </a:solidFill>
-                <a:latin typeface="Consolas"/>
-                <a:ea typeface="Consolas"/>
-                <a:cs typeface="Consolas"/>
-                <a:sym typeface="Consolas"/>
-              </a:rPr>
-              <a:t> </a:t>
-            </a:r>
-            <a:r>
               <a:rPr sz="2400" b="1" dirty="0">
                 <a:solidFill>
                   <a:srgbClr val="9BBB59"/>
@@ -8579,7 +8526,7 @@
                 <a:cs typeface="Consolas"/>
                 <a:sym typeface="Consolas"/>
               </a:rPr>
-              <a:t>= …</a:t>
+              <a:t> = …</a:t>
             </a:r>
             <a:br>
               <a:rPr sz="2400" b="1" dirty="0">
@@ -9430,13 +9377,6 @@
   <p:clrMapOvr>
     <a:masterClrMapping/>
   </p:clrMapOvr>
-  <p:timing>
-    <p:tnLst>
-      <p:par>
-        <p:cTn id="1" dur="indefinite" restart="never" nodeType="tmRoot"/>
-      </p:par>
-    </p:tnLst>
-  </p:timing>
 </p:sld>
 </file>
 
@@ -9581,13 +9521,6 @@
   <p:clrMapOvr>
     <a:masterClrMapping/>
   </p:clrMapOvr>
-  <p:timing>
-    <p:tnLst>
-      <p:par>
-        <p:cTn id="1" dur="indefinite" restart="never" nodeType="tmRoot"/>
-      </p:par>
-    </p:tnLst>
-  </p:timing>
 </p:sld>
 </file>
 
@@ -9763,13 +9696,6 @@
   <p:clrMapOvr>
     <a:masterClrMapping/>
   </p:clrMapOvr>
-  <p:timing>
-    <p:tnLst>
-      <p:par>
-        <p:cTn id="1" dur="indefinite" restart="never" nodeType="tmRoot"/>
-      </p:par>
-    </p:tnLst>
-  </p:timing>
 </p:sld>
 </file>
 
@@ -9834,10 +9760,9 @@
               </a:spcAft>
             </a:pPr>
             <a:r>
-              <a:rPr lang="en-US" dirty="0" smtClean="0"/>
+              <a:rPr lang="en-US" dirty="0"/>
               <a:t>Pull Latest Version of Code/Slides</a:t>
             </a:r>
-            <a:endParaRPr lang="en-US" dirty="0"/>
           </a:p>
         </p:txBody>
       </p:sp>
@@ -10008,10 +9933,9 @@
               <a:buNone/>
             </a:pPr>
             <a:r>
-              <a:rPr lang="en-US" dirty="0" smtClean="0"/>
+              <a:rPr lang="en-US" dirty="0"/>
               <a:t>Team Pull</a:t>
             </a:r>
-            <a:endParaRPr lang="en-US" dirty="0"/>
           </a:p>
         </p:txBody>
       </p:sp>
@@ -10114,14 +10038,10 @@
             </a:pPr>
             <a:r>
               <a:rPr sz="4400" b="1" dirty="0"/>
-              <a:t>CSSE </a:t>
-            </a:r>
-            <a:r>
-              <a:rPr sz="4400" b="1" dirty="0" smtClean="0"/>
-              <a:t>220</a:t>
-            </a:r>
-            <a:r>
-              <a:rPr lang="en-US" sz="4400" b="1" dirty="0" smtClean="0"/>
+              <a:t>CSSE 220</a:t>
+            </a:r>
+            <a:r>
+              <a:rPr lang="en-US" sz="4400" b="1" dirty="0"/>
               <a:t> – every class do this:</a:t>
             </a:r>
             <a:endParaRPr sz="4400" b="1" dirty="0"/>
@@ -10138,13 +10058,6 @@
   <p:clrMapOvr>
     <a:masterClrMapping/>
   </p:clrMapOvr>
-  <p:timing>
-    <p:tnLst>
-      <p:par>
-        <p:cTn id="1" dur="indefinite" restart="never" nodeType="tmRoot"/>
-      </p:par>
-    </p:tnLst>
-  </p:timing>
 </p:sld>
 </file>
 
@@ -10245,13 +10158,6 @@
   <p:clrMapOvr>
     <a:masterClrMapping/>
   </p:clrMapOvr>
-  <p:timing>
-    <p:tnLst>
-      <p:par>
-        <p:cTn id="1" dur="indefinite" restart="never" nodeType="tmRoot"/>
-      </p:par>
-    </p:tnLst>
-  </p:timing>
 </p:sld>
 </file>
 
@@ -10352,13 +10258,6 @@
   <p:clrMapOvr>
     <a:masterClrMapping/>
   </p:clrMapOvr>
-  <p:timing>
-    <p:tnLst>
-      <p:par>
-        <p:cTn id="1" dur="indefinite" restart="never" nodeType="tmRoot"/>
-      </p:par>
-    </p:tnLst>
-  </p:timing>
 </p:sld>
 </file>
 
@@ -10459,13 +10358,6 @@
   <p:clrMapOvr>
     <a:masterClrMapping/>
   </p:clrMapOvr>
-  <p:timing>
-    <p:tnLst>
-      <p:par>
-        <p:cTn id="1" dur="indefinite" restart="never" nodeType="tmRoot"/>
-      </p:par>
-    </p:tnLst>
-  </p:timing>
 </p:sld>
 </file>
 
@@ -10599,13 +10491,6 @@
   <p:clrMapOvr>
     <a:masterClrMapping/>
   </p:clrMapOvr>
-  <p:timing>
-    <p:tnLst>
-      <p:par>
-        <p:cTn id="1" dur="indefinite" restart="never" nodeType="tmRoot"/>
-      </p:par>
-    </p:tnLst>
-  </p:timing>
 </p:sld>
 </file>
 
@@ -10719,13 +10604,6 @@
   <p:clrMapOvr>
     <a:masterClrMapping/>
   </p:clrMapOvr>
-  <p:timing>
-    <p:tnLst>
-      <p:par>
-        <p:cTn id="1" dur="indefinite" restart="never" nodeType="tmRoot"/>
-      </p:par>
-    </p:tnLst>
-  </p:timing>
 </p:sld>
 </file>
 
@@ -10868,13 +10746,6 @@
   <p:clrMapOvr>
     <a:masterClrMapping/>
   </p:clrMapOvr>
-  <p:timing>
-    <p:tnLst>
-      <p:par>
-        <p:cTn id="1" dur="indefinite" restart="never" nodeType="tmRoot"/>
-      </p:par>
-    </p:tnLst>
-  </p:timing>
 </p:sld>
 </file>
 
@@ -11017,21 +10888,6 @@
   <p:clrMapOvr>
     <a:masterClrMapping/>
   </p:clrMapOvr>
-  <mc:AlternateContent xmlns:mc="http://schemas.openxmlformats.org/markup-compatibility/2006" xmlns:p14="http://schemas.microsoft.com/office/powerpoint/2010/main">
-    <mc:Choice Requires="p14">
-      <p:transition spd="slow" p14:dur="2000"/>
-    </mc:Choice>
-    <mc:Fallback xmlns="">
-      <p:transition spd="slow"/>
-    </mc:Fallback>
-  </mc:AlternateContent>
-  <p:timing>
-    <p:tnLst>
-      <p:par>
-        <p:cTn id="1" dur="indefinite" restart="never" nodeType="tmRoot"/>
-      </p:par>
-    </p:tnLst>
-  </p:timing>
 </p:sld>
 </file>
 
@@ -11203,21 +11059,6 @@
   <p:clrMapOvr>
     <a:masterClrMapping/>
   </p:clrMapOvr>
-  <mc:AlternateContent xmlns:mc="http://schemas.openxmlformats.org/markup-compatibility/2006" xmlns:p14="http://schemas.microsoft.com/office/powerpoint/2010/main">
-    <mc:Choice Requires="p14">
-      <p:transition spd="slow" p14:dur="2000"/>
-    </mc:Choice>
-    <mc:Fallback xmlns="">
-      <p:transition spd="slow"/>
-    </mc:Fallback>
-  </mc:AlternateContent>
-  <p:timing>
-    <p:tnLst>
-      <p:par>
-        <p:cTn id="1" dur="indefinite" restart="never" nodeType="tmRoot"/>
-      </p:par>
-    </p:tnLst>
-  </p:timing>
 </p:sld>
 </file>
 
@@ -11389,21 +11230,6 @@
   <p:clrMapOvr>
     <a:masterClrMapping/>
   </p:clrMapOvr>
-  <mc:AlternateContent xmlns:mc="http://schemas.openxmlformats.org/markup-compatibility/2006" xmlns:p14="http://schemas.microsoft.com/office/powerpoint/2010/main">
-    <mc:Choice Requires="p14">
-      <p:transition spd="slow" p14:dur="2000"/>
-    </mc:Choice>
-    <mc:Fallback xmlns="">
-      <p:transition spd="slow"/>
-    </mc:Fallback>
-  </mc:AlternateContent>
-  <p:timing>
-    <p:tnLst>
-      <p:par>
-        <p:cTn id="1" dur="indefinite" restart="never" nodeType="tmRoot"/>
-      </p:par>
-    </p:tnLst>
-  </p:timing>
 </p:sld>
 </file>
 
@@ -11604,21 +11430,6 @@
   <p:clrMapOvr>
     <a:masterClrMapping/>
   </p:clrMapOvr>
-  <mc:AlternateContent xmlns:mc="http://schemas.openxmlformats.org/markup-compatibility/2006" xmlns:p14="http://schemas.microsoft.com/office/powerpoint/2010/main">
-    <mc:Choice Requires="p14">
-      <p:transition spd="slow" p14:dur="2000"/>
-    </mc:Choice>
-    <mc:Fallback xmlns="">
-      <p:transition spd="slow"/>
-    </mc:Fallback>
-  </mc:AlternateContent>
-  <p:timing>
-    <p:tnLst>
-      <p:par>
-        <p:cTn id="1" dur="indefinite" restart="never" nodeType="tmRoot"/>
-      </p:par>
-    </p:tnLst>
-  </p:timing>
 </p:sld>
 </file>
 
@@ -11660,10 +11471,9 @@
           <a:lstStyle/>
           <a:p>
             <a:r>
-              <a:rPr lang="en-US" dirty="0" smtClean="0"/>
+              <a:rPr lang="en-US" dirty="0"/>
               <a:t>How to access slides (locally)</a:t>
             </a:r>
-            <a:endParaRPr lang="en-US" dirty="0"/>
           </a:p>
         </p:txBody>
       </p:sp>
@@ -11725,13 +11535,6 @@
   <p:clrMapOvr>
     <a:masterClrMapping/>
   </p:clrMapOvr>
-  <p:timing>
-    <p:tnLst>
-      <p:par>
-        <p:cTn id="1" dur="indefinite" restart="never" nodeType="tmRoot"/>
-      </p:par>
-    </p:tnLst>
-  </p:timing>
 </p:sld>
 </file>
 
@@ -11932,21 +11735,6 @@
   <p:clrMapOvr>
     <a:masterClrMapping/>
   </p:clrMapOvr>
-  <mc:AlternateContent xmlns:mc="http://schemas.openxmlformats.org/markup-compatibility/2006" xmlns:p14="http://schemas.microsoft.com/office/powerpoint/2010/main">
-    <mc:Choice Requires="p14">
-      <p:transition spd="slow" p14:dur="2000"/>
-    </mc:Choice>
-    <mc:Fallback xmlns="">
-      <p:transition spd="slow"/>
-    </mc:Fallback>
-  </mc:AlternateContent>
-  <p:timing>
-    <p:tnLst>
-      <p:par>
-        <p:cTn id="1" dur="indefinite" restart="never" nodeType="tmRoot"/>
-      </p:par>
-    </p:tnLst>
-  </p:timing>
 </p:sld>
 </file>
 
@@ -12176,21 +11964,6 @@
   <p:clrMapOvr>
     <a:masterClrMapping/>
   </p:clrMapOvr>
-  <mc:AlternateContent xmlns:mc="http://schemas.openxmlformats.org/markup-compatibility/2006" xmlns:p14="http://schemas.microsoft.com/office/powerpoint/2010/main">
-    <mc:Choice Requires="p14">
-      <p:transition spd="slow" p14:dur="2000"/>
-    </mc:Choice>
-    <mc:Fallback xmlns="">
-      <p:transition spd="slow"/>
-    </mc:Fallback>
-  </mc:AlternateContent>
-  <p:timing>
-    <p:tnLst>
-      <p:par>
-        <p:cTn id="1" dur="indefinite" restart="never" nodeType="tmRoot"/>
-      </p:par>
-    </p:tnLst>
-  </p:timing>
 </p:sld>
 </file>
 
@@ -12420,21 +12193,6 @@
   <p:clrMapOvr>
     <a:masterClrMapping/>
   </p:clrMapOvr>
-  <mc:AlternateContent xmlns:mc="http://schemas.openxmlformats.org/markup-compatibility/2006" xmlns:p14="http://schemas.microsoft.com/office/powerpoint/2010/main">
-    <mc:Choice Requires="p14">
-      <p:transition spd="slow" p14:dur="2000"/>
-    </mc:Choice>
-    <mc:Fallback xmlns="">
-      <p:transition spd="slow"/>
-    </mc:Fallback>
-  </mc:AlternateContent>
-  <p:timing>
-    <p:tnLst>
-      <p:par>
-        <p:cTn id="1" dur="indefinite" restart="never" nodeType="tmRoot"/>
-      </p:par>
-    </p:tnLst>
-  </p:timing>
 </p:sld>
 </file>
 
@@ -12693,21 +12451,6 @@
   <p:clrMapOvr>
     <a:masterClrMapping/>
   </p:clrMapOvr>
-  <mc:AlternateContent xmlns:mc="http://schemas.openxmlformats.org/markup-compatibility/2006" xmlns:p14="http://schemas.microsoft.com/office/powerpoint/2010/main">
-    <mc:Choice Requires="p14">
-      <p:transition spd="slow" p14:dur="2000"/>
-    </mc:Choice>
-    <mc:Fallback xmlns="">
-      <p:transition spd="slow"/>
-    </mc:Fallback>
-  </mc:AlternateContent>
-  <p:timing>
-    <p:tnLst>
-      <p:par>
-        <p:cTn id="1" dur="indefinite" restart="never" nodeType="tmRoot"/>
-      </p:par>
-    </p:tnLst>
-  </p:timing>
 </p:sld>
 </file>
 
@@ -12966,21 +12709,6 @@
   <p:clrMapOvr>
     <a:masterClrMapping/>
   </p:clrMapOvr>
-  <mc:AlternateContent xmlns:mc="http://schemas.openxmlformats.org/markup-compatibility/2006" xmlns:p14="http://schemas.microsoft.com/office/powerpoint/2010/main">
-    <mc:Choice Requires="p14">
-      <p:transition spd="slow" p14:dur="2000"/>
-    </mc:Choice>
-    <mc:Fallback xmlns="">
-      <p:transition spd="slow"/>
-    </mc:Fallback>
-  </mc:AlternateContent>
-  <p:timing>
-    <p:tnLst>
-      <p:par>
-        <p:cTn id="1" dur="indefinite" restart="never" nodeType="tmRoot"/>
-      </p:par>
-    </p:tnLst>
-  </p:timing>
 </p:sld>
 </file>
 
@@ -13268,21 +12996,6 @@
   <p:clrMapOvr>
     <a:masterClrMapping/>
   </p:clrMapOvr>
-  <mc:AlternateContent xmlns:mc="http://schemas.openxmlformats.org/markup-compatibility/2006" xmlns:p14="http://schemas.microsoft.com/office/powerpoint/2010/main">
-    <mc:Choice Requires="p14">
-      <p:transition spd="slow" p14:dur="2000"/>
-    </mc:Choice>
-    <mc:Fallback xmlns="">
-      <p:transition spd="slow"/>
-    </mc:Fallback>
-  </mc:AlternateContent>
-  <p:timing>
-    <p:tnLst>
-      <p:par>
-        <p:cTn id="1" dur="indefinite" restart="never" nodeType="tmRoot"/>
-      </p:par>
-    </p:tnLst>
-  </p:timing>
 </p:sld>
 </file>
 
@@ -13570,21 +13283,6 @@
   <p:clrMapOvr>
     <a:masterClrMapping/>
   </p:clrMapOvr>
-  <mc:AlternateContent xmlns:mc="http://schemas.openxmlformats.org/markup-compatibility/2006" xmlns:p14="http://schemas.microsoft.com/office/powerpoint/2010/main">
-    <mc:Choice Requires="p14">
-      <p:transition spd="slow" p14:dur="2000"/>
-    </mc:Choice>
-    <mc:Fallback xmlns="">
-      <p:transition spd="slow"/>
-    </mc:Fallback>
-  </mc:AlternateContent>
-  <p:timing>
-    <p:tnLst>
-      <p:par>
-        <p:cTn id="1" dur="indefinite" restart="never" nodeType="tmRoot"/>
-      </p:par>
-    </p:tnLst>
-  </p:timing>
 </p:sld>
 </file>
 
@@ -13901,21 +13599,6 @@
   <p:clrMapOvr>
     <a:masterClrMapping/>
   </p:clrMapOvr>
-  <mc:AlternateContent xmlns:mc="http://schemas.openxmlformats.org/markup-compatibility/2006" xmlns:p14="http://schemas.microsoft.com/office/powerpoint/2010/main">
-    <mc:Choice Requires="p14">
-      <p:transition spd="slow" p14:dur="2000"/>
-    </mc:Choice>
-    <mc:Fallback xmlns="">
-      <p:transition spd="slow"/>
-    </mc:Fallback>
-  </mc:AlternateContent>
-  <p:timing>
-    <p:tnLst>
-      <p:par>
-        <p:cTn id="1" dur="indefinite" restart="never" nodeType="tmRoot"/>
-      </p:par>
-    </p:tnLst>
-  </p:timing>
 </p:sld>
 </file>
 
@@ -14057,13 +13740,6 @@
   <p:clrMapOvr>
     <a:masterClrMapping/>
   </p:clrMapOvr>
-  <p:timing>
-    <p:tnLst>
-      <p:par>
-        <p:cTn id="1" dur="indefinite" restart="never" nodeType="tmRoot"/>
-      </p:par>
-    </p:tnLst>
-  </p:timing>
 </p:sld>
 </file>
 
@@ -14184,13 +13860,6 @@
   <p:clrMapOvr>
     <a:masterClrMapping/>
   </p:clrMapOvr>
-  <p:timing>
-    <p:tnLst>
-      <p:par>
-        <p:cTn id="1" dur="indefinite" restart="never" nodeType="tmRoot"/>
-      </p:par>
-    </p:tnLst>
-  </p:timing>
 </p:sld>
 </file>
 
@@ -14271,7 +13940,7 @@
               <a:t>2DArraysAndMapsInClass</a:t>
             </a:r>
             <a:r>
-              <a:rPr sz="2400" i="1" dirty="0" smtClean="0">
+              <a:rPr sz="2400" i="1" dirty="0">
                 <a:solidFill>
                   <a:srgbClr val="FFFFFF"/>
                 </a:solidFill>
@@ -14300,15 +13969,7 @@
                   <a:srgbClr val="FFFFFF"/>
                 </a:solidFill>
               </a:rPr>
-              <a:t> </a:t>
-            </a:r>
-            <a:r>
-              <a:rPr lang="en-US" sz="2400" dirty="0" smtClean="0">
-                <a:solidFill>
-                  <a:srgbClr val="FFFFFF"/>
-                </a:solidFill>
-              </a:rPr>
-              <a:t>repo</a:t>
+              <a:t> repo</a:t>
             </a:r>
             <a:endParaRPr sz="2400" dirty="0">
               <a:solidFill>
@@ -14348,14 +14009,10 @@
             </a:pPr>
             <a:r>
               <a:rPr sz="4400" dirty="0"/>
-              <a:t>CSSE </a:t>
-            </a:r>
-            <a:r>
-              <a:rPr sz="4400" dirty="0" smtClean="0"/>
-              <a:t>220</a:t>
-            </a:r>
-            <a:r>
-              <a:rPr lang="en-US" sz="4400" dirty="0" smtClean="0"/>
+              <a:t>CSSE 220</a:t>
+            </a:r>
+            <a:r>
+              <a:rPr lang="en-US" sz="4400" dirty="0"/>
               <a:t> – every class do this:</a:t>
             </a:r>
             <a:endParaRPr sz="4400" dirty="0"/>
@@ -14632,7 +14289,7 @@
               <a:tabLst/>
             </a:pPr>
             <a:r>
-              <a:rPr kumimoji="0" lang="en-US" sz="1800" b="0" i="0" u="none" strike="noStrike" cap="none" spc="0" normalizeH="0" baseline="0" dirty="0" smtClean="0">
+              <a:rPr kumimoji="0" lang="en-US" sz="1800" b="0" i="0" u="none" strike="noStrike" cap="none" spc="0" normalizeH="0" baseline="0" dirty="0">
                 <a:ln>
                   <a:noFill/>
                 </a:ln>
@@ -14667,7 +14324,7 @@
               <a:tabLst/>
             </a:pPr>
             <a:r>
-              <a:rPr kumimoji="0" lang="en-US" sz="1800" b="0" i="0" u="none" strike="noStrike" cap="none" spc="0" normalizeH="0" baseline="0" dirty="0" err="1" smtClean="0">
+              <a:rPr kumimoji="0" lang="en-US" sz="1800" b="0" i="0" u="none" strike="noStrike" cap="none" spc="0" normalizeH="0" baseline="0" dirty="0" err="1">
                 <a:ln>
                   <a:noFill/>
                 </a:ln>
@@ -14684,7 +14341,7 @@
               <a:t>Git</a:t>
             </a:r>
             <a:r>
-              <a:rPr kumimoji="0" lang="en-US" sz="1800" b="0" i="0" u="none" strike="noStrike" cap="none" spc="0" normalizeH="0" baseline="0" dirty="0" smtClean="0">
+              <a:rPr kumimoji="0" lang="en-US" sz="1800" b="0" i="0" u="none" strike="noStrike" cap="none" spc="0" normalizeH="0" baseline="0" dirty="0">
                 <a:ln>
                   <a:noFill/>
                 </a:ln>
@@ -14701,7 +14358,7 @@
               <a:t>-&gt;Projects from </a:t>
             </a:r>
             <a:r>
-              <a:rPr kumimoji="0" lang="en-US" sz="1800" b="0" i="0" u="none" strike="noStrike" cap="none" spc="0" normalizeH="0" baseline="0" dirty="0" err="1" smtClean="0">
+              <a:rPr kumimoji="0" lang="en-US" sz="1800" b="0" i="0" u="none" strike="noStrike" cap="none" spc="0" normalizeH="0" baseline="0" dirty="0" err="1">
                 <a:ln>
                   <a:noFill/>
                 </a:ln>
@@ -14718,7 +14375,7 @@
               <a:t>Git</a:t>
             </a:r>
             <a:r>
-              <a:rPr kumimoji="0" lang="en-US" sz="1800" b="0" i="0" u="none" strike="noStrike" cap="none" spc="0" normalizeH="0" baseline="0" dirty="0" smtClean="0">
+              <a:rPr kumimoji="0" lang="en-US" sz="1800" b="0" i="0" u="none" strike="noStrike" cap="none" spc="0" normalizeH="0" baseline="0" dirty="0">
                 <a:ln>
                   <a:noFill/>
                 </a:ln>
@@ -14753,7 +14410,7 @@
               <a:tabLst/>
             </a:pPr>
             <a:r>
-              <a:rPr lang="en-US" dirty="0" smtClean="0">
+              <a:rPr lang="en-US" dirty="0">
                 <a:solidFill>
                   <a:srgbClr val="000000"/>
                 </a:solidFill>
@@ -14779,7 +14436,7 @@
               <a:tabLst/>
             </a:pPr>
             <a:r>
-              <a:rPr kumimoji="0" lang="en-US" sz="1800" b="0" i="0" u="none" strike="noStrike" cap="none" spc="0" normalizeH="0" baseline="0" dirty="0" smtClean="0">
+              <a:rPr kumimoji="0" lang="en-US" sz="1800" b="0" i="0" u="none" strike="noStrike" cap="none" spc="0" normalizeH="0" baseline="0" dirty="0">
                 <a:ln>
                   <a:noFill/>
                 </a:ln>
@@ -14796,7 +14453,7 @@
               <a:t>csse220 [master</a:t>
             </a:r>
             <a:r>
-              <a:rPr lang="en-US" dirty="0" smtClean="0">
+              <a:rPr lang="en-US" dirty="0">
                 <a:solidFill>
                   <a:srgbClr val="000000"/>
                 </a:solidFill>
@@ -14822,7 +14479,7 @@
               <a:tabLst/>
             </a:pPr>
             <a:r>
-              <a:rPr kumimoji="0" lang="en-US" sz="1800" b="0" i="0" u="none" strike="noStrike" cap="none" spc="0" normalizeH="0" baseline="0" dirty="0" smtClean="0">
+              <a:rPr kumimoji="0" lang="en-US" sz="1800" b="0" i="0" u="none" strike="noStrike" cap="none" spc="0" normalizeH="0" baseline="0" dirty="0">
                 <a:ln>
                   <a:noFill/>
                 </a:ln>
@@ -14857,7 +14514,7 @@
               <a:tabLst/>
             </a:pPr>
             <a:r>
-              <a:rPr lang="en-US" b="1" u="sng" dirty="0" smtClean="0">
+              <a:rPr lang="en-US" b="1" u="sng" dirty="0">
                 <a:solidFill>
                   <a:srgbClr val="FF0000"/>
                 </a:solidFill>
@@ -14883,7 +14540,7 @@
               <a:tabLst/>
             </a:pPr>
             <a:r>
-              <a:rPr lang="en-US" b="1" dirty="0" smtClean="0">
+              <a:rPr lang="en-US" b="1" dirty="0">
                 <a:solidFill>
                   <a:schemeClr val="tx1"/>
                 </a:solidFill>
@@ -14909,18 +14566,13 @@
               <a:tabLst/>
             </a:pPr>
             <a:r>
-              <a:rPr lang="en-US" dirty="0" smtClean="0">
+              <a:rPr lang="en-US" dirty="0">
                 <a:solidFill>
                   <a:schemeClr val="tx1"/>
                 </a:solidFill>
               </a:rPr>
               <a:t>Check projects for the day -&gt; Finish</a:t>
             </a:r>
-            <a:endParaRPr lang="en-US" dirty="0">
-              <a:solidFill>
-                <a:schemeClr val="tx1"/>
-              </a:solidFill>
-            </a:endParaRPr>
           </a:p>
         </p:txBody>
       </p:sp>
@@ -14978,21 +14630,6 @@
   <p:clrMapOvr>
     <a:masterClrMapping/>
   </p:clrMapOvr>
-  <mc:AlternateContent xmlns:mc="http://schemas.openxmlformats.org/markup-compatibility/2006" xmlns:p14="http://schemas.microsoft.com/office/powerpoint/2010/main">
-    <mc:Choice Requires="p14">
-      <p:transition spd="slow" p14:dur="2000"/>
-    </mc:Choice>
-    <mc:Fallback xmlns="">
-      <p:transition spd="slow"/>
-    </mc:Fallback>
-  </mc:AlternateContent>
-  <p:timing>
-    <p:tnLst>
-      <p:par>
-        <p:cTn id="1" dur="indefinite" restart="never" nodeType="tmRoot"/>
-      </p:par>
-    </p:tnLst>
-  </p:timing>
 </p:sld>
 </file>
 
@@ -15225,13 +14862,6 @@
   <p:clrMapOvr>
     <a:masterClrMapping/>
   </p:clrMapOvr>
-  <p:timing>
-    <p:tnLst>
-      <p:par>
-        <p:cTn id="1" dur="indefinite" restart="never" nodeType="tmRoot"/>
-      </p:par>
-    </p:tnLst>
-  </p:timing>
 </p:sld>
 </file>
 
@@ -16168,21 +15798,6 @@
   <p:clrMapOvr>
     <a:masterClrMapping/>
   </p:clrMapOvr>
-  <mc:AlternateContent xmlns:mc="http://schemas.openxmlformats.org/markup-compatibility/2006">
-    <mc:Choice xmlns:p14="http://schemas.microsoft.com/office/powerpoint/2010/main" Requires="p14">
-      <p:transition spd="slow" p14:dur="2000"/>
-    </mc:Choice>
-    <mc:Fallback>
-      <p:transition spd="slow"/>
-    </mc:Fallback>
-  </mc:AlternateContent>
-  <p:timing>
-    <p:tnLst>
-      <p:par>
-        <p:cTn id="1" dur="indefinite" restart="never" nodeType="tmRoot"/>
-      </p:par>
-    </p:tnLst>
-  </p:timing>
 </p:sld>
 </file>
 
@@ -16248,89 +15863,46 @@
           <a:lstStyle/>
           <a:p>
             <a:r>
-              <a:rPr lang="en-US" sz="2400" dirty="0" smtClean="0"/>
-              <a:t>Read </a:t>
-            </a:r>
-            <a:r>
               <a:rPr lang="en-US" sz="2400" dirty="0"/>
-              <a:t>through the 3 2D Array sample problems </a:t>
-            </a:r>
-            <a:r>
-              <a:rPr lang="en-US" sz="2400" dirty="0" smtClean="0"/>
-              <a:t>make </a:t>
-            </a:r>
+              <a:t>Read through the 3 2D Array sample problems make sure you understand how they work</a:t>
+            </a:r>
+          </a:p>
+          <a:p>
+            <a:pPr lvl="1"/>
+            <a:r>
+              <a:rPr lang="en-US" sz="2000" dirty="0"/>
+              <a:t>Instructions to see samples on next slide</a:t>
+            </a:r>
+          </a:p>
+          <a:p>
             <a:r>
               <a:rPr lang="en-US" sz="2400" dirty="0"/>
-              <a:t>sure you </a:t>
-            </a:r>
-            <a:r>
-              <a:rPr lang="en-US" sz="2400" dirty="0" smtClean="0"/>
-              <a:t>understand </a:t>
-            </a:r>
+              <a:t>Then use the code as an example to answer the 2D Array quiz questions (on Moodle)</a:t>
+            </a:r>
+          </a:p>
+          <a:p>
             <a:r>
               <a:rPr lang="en-US" sz="2400" dirty="0"/>
-              <a:t>how they </a:t>
-            </a:r>
-            <a:r>
-              <a:rPr lang="en-US" sz="2400" dirty="0" smtClean="0"/>
-              <a:t>work</a:t>
-            </a:r>
-          </a:p>
-          <a:p>
-            <a:pPr lvl="1"/>
-            <a:r>
-              <a:rPr lang="en-US" sz="2000" dirty="0"/>
-              <a:t>Instructions to see </a:t>
-            </a:r>
-            <a:r>
-              <a:rPr lang="en-US" sz="2000" dirty="0" smtClean="0"/>
-              <a:t>samples on next slide</a:t>
-            </a:r>
-            <a:endParaRPr lang="en-US" sz="2000" dirty="0"/>
-          </a:p>
-          <a:p>
-            <a:r>
-              <a:rPr lang="en-US" sz="2400" dirty="0" smtClean="0"/>
-              <a:t>Then </a:t>
-            </a:r>
+              <a:t>Then do the 2d sample problems in the in-class exercise for today</a:t>
+            </a:r>
+          </a:p>
+          <a:p>
             <a:r>
               <a:rPr lang="en-US" sz="2400" dirty="0"/>
-              <a:t>use the code as an example to answer the 2D Array quiz </a:t>
-            </a:r>
-            <a:r>
-              <a:rPr lang="en-US" sz="2400" dirty="0" smtClean="0"/>
-              <a:t>questions (on Moodle)</a:t>
-            </a:r>
-            <a:endParaRPr lang="en-US" sz="2400" dirty="0"/>
-          </a:p>
-          <a:p>
+              <a:t>Post ANY questions to Piazza </a:t>
+            </a:r>
+            <a:r>
+              <a:rPr lang="en-US" sz="2400" b="1" i="1" u="sng" dirty="0"/>
+              <a:t>even including code </a:t>
+            </a:r>
             <a:r>
               <a:rPr lang="en-US" sz="2400" dirty="0"/>
-              <a:t>Then do the 2d sample </a:t>
-            </a:r>
-            <a:r>
-              <a:rPr lang="en-US" sz="2400" dirty="0" smtClean="0"/>
-              <a:t>problems in the in-class exercise for today</a:t>
-            </a:r>
-            <a:endParaRPr lang="en-US" sz="2400" dirty="0"/>
-          </a:p>
-          <a:p>
-            <a:r>
-              <a:rPr lang="en-US" sz="2400" dirty="0" smtClean="0"/>
-              <a:t>Post ANY questions to Piazza </a:t>
-            </a:r>
-            <a:r>
-              <a:rPr lang="en-US" sz="2400" b="1" i="1" u="sng" dirty="0" smtClean="0"/>
-              <a:t>even including code </a:t>
-            </a:r>
-            <a:r>
-              <a:rPr lang="en-US" sz="2400" dirty="0" smtClean="0"/>
               <a:t>since this is purely collaborative exercise and the solution code is available to you</a:t>
             </a:r>
           </a:p>
           <a:p>
             <a:r>
-              <a:rPr lang="en-US" sz="2400" dirty="0" smtClean="0"/>
+              <a:rPr lang="en-US" sz="2400" dirty="0"/>
               <a:t>Please look to help answer questions other students post</a:t>
             </a:r>
           </a:p>
@@ -16346,21 +15918,6 @@
   <p:clrMapOvr>
     <a:masterClrMapping/>
   </p:clrMapOvr>
-  <mc:AlternateContent xmlns:mc="http://schemas.openxmlformats.org/markup-compatibility/2006">
-    <mc:Choice xmlns:p14="http://schemas.microsoft.com/office/powerpoint/2010/main" Requires="p14">
-      <p:transition spd="slow" p14:dur="2000"/>
-    </mc:Choice>
-    <mc:Fallback>
-      <p:transition spd="slow"/>
-    </mc:Fallback>
-  </mc:AlternateContent>
-  <p:timing>
-    <p:tnLst>
-      <p:par>
-        <p:cTn id="1" dur="indefinite" restart="never" nodeType="tmRoot"/>
-      </p:par>
-    </p:tnLst>
-  </p:timing>
 </p:sld>
 </file>
 
@@ -16647,7 +16204,7 @@
           <a:p>
             <a:pPr algn="ctr"/>
             <a:r>
-              <a:rPr lang="en-US" sz="5400" b="1" cap="none" spc="0" dirty="0" smtClean="0">
+              <a:rPr lang="en-US" sz="5400" b="1" cap="none" spc="0" dirty="0">
                 <a:ln w="22225">
                   <a:solidFill>
                     <a:schemeClr val="accent2"/>
@@ -16664,21 +16221,6 @@
               </a:rPr>
               <a:t>1</a:t>
             </a:r>
-            <a:endParaRPr lang="en-US" sz="5400" b="1" cap="none" spc="0" dirty="0">
-              <a:ln w="22225">
-                <a:solidFill>
-                  <a:schemeClr val="accent2"/>
-                </a:solidFill>
-                <a:prstDash val="solid"/>
-              </a:ln>
-              <a:solidFill>
-                <a:schemeClr val="accent2">
-                  <a:lumMod val="40000"/>
-                  <a:lumOff val="60000"/>
-                </a:schemeClr>
-              </a:solidFill>
-              <a:effectLst/>
-            </a:endParaRPr>
           </a:p>
         </p:txBody>
       </p:sp>
@@ -16706,7 +16248,7 @@
           <a:p>
             <a:pPr algn="ctr"/>
             <a:r>
-              <a:rPr lang="en-US" sz="5400" b="1" cap="none" spc="0" dirty="0" smtClean="0">
+              <a:rPr lang="en-US" sz="5400" b="1" cap="none" spc="0" dirty="0">
                 <a:ln w="22225">
                   <a:solidFill>
                     <a:schemeClr val="accent2"/>
@@ -16723,21 +16265,6 @@
               </a:rPr>
               <a:t>2</a:t>
             </a:r>
-            <a:endParaRPr lang="en-US" sz="5400" b="1" cap="none" spc="0" dirty="0">
-              <a:ln w="22225">
-                <a:solidFill>
-                  <a:schemeClr val="accent2"/>
-                </a:solidFill>
-                <a:prstDash val="solid"/>
-              </a:ln>
-              <a:solidFill>
-                <a:schemeClr val="accent2">
-                  <a:lumMod val="40000"/>
-                  <a:lumOff val="60000"/>
-                </a:schemeClr>
-              </a:solidFill>
-              <a:effectLst/>
-            </a:endParaRPr>
           </a:p>
         </p:txBody>
       </p:sp>
@@ -16765,7 +16292,7 @@
           <a:p>
             <a:pPr algn="ctr"/>
             <a:r>
-              <a:rPr lang="en-US" sz="5400" b="1" cap="none" spc="0" dirty="0" smtClean="0">
+              <a:rPr lang="en-US" sz="5400" b="1" cap="none" spc="0" dirty="0">
                 <a:ln w="22225">
                   <a:solidFill>
                     <a:schemeClr val="accent2"/>
@@ -16782,21 +16309,6 @@
               </a:rPr>
               <a:t>3</a:t>
             </a:r>
-            <a:endParaRPr lang="en-US" sz="5400" b="1" cap="none" spc="0" dirty="0">
-              <a:ln w="22225">
-                <a:solidFill>
-                  <a:schemeClr val="accent2"/>
-                </a:solidFill>
-                <a:prstDash val="solid"/>
-              </a:ln>
-              <a:solidFill>
-                <a:schemeClr val="accent2">
-                  <a:lumMod val="40000"/>
-                  <a:lumOff val="60000"/>
-                </a:schemeClr>
-              </a:solidFill>
-              <a:effectLst/>
-            </a:endParaRPr>
           </a:p>
         </p:txBody>
       </p:sp>
@@ -16824,7 +16336,7 @@
           <a:p>
             <a:pPr algn="ctr"/>
             <a:r>
-              <a:rPr lang="en-US" sz="5400" b="1" cap="none" spc="0" dirty="0" smtClean="0">
+              <a:rPr lang="en-US" sz="5400" b="1" cap="none" spc="0" dirty="0">
                 <a:ln w="22225">
                   <a:solidFill>
                     <a:schemeClr val="accent2"/>
@@ -16841,21 +16353,6 @@
               </a:rPr>
               <a:t>4</a:t>
             </a:r>
-            <a:endParaRPr lang="en-US" sz="5400" b="1" cap="none" spc="0" dirty="0">
-              <a:ln w="22225">
-                <a:solidFill>
-                  <a:schemeClr val="accent2"/>
-                </a:solidFill>
-                <a:prstDash val="solid"/>
-              </a:ln>
-              <a:solidFill>
-                <a:schemeClr val="accent2">
-                  <a:lumMod val="40000"/>
-                  <a:lumOff val="60000"/>
-                </a:schemeClr>
-              </a:solidFill>
-              <a:effectLst/>
-            </a:endParaRPr>
           </a:p>
         </p:txBody>
       </p:sp>
@@ -16869,21 +16366,6 @@
   <p:clrMapOvr>
     <a:masterClrMapping/>
   </p:clrMapOvr>
-  <mc:AlternateContent xmlns:mc="http://schemas.openxmlformats.org/markup-compatibility/2006">
-    <mc:Choice xmlns:p14="http://schemas.microsoft.com/office/powerpoint/2010/main" Requires="p14">
-      <p:transition spd="slow" p14:dur="2000"/>
-    </mc:Choice>
-    <mc:Fallback>
-      <p:transition spd="slow"/>
-    </mc:Fallback>
-  </mc:AlternateContent>
-  <p:timing>
-    <p:tnLst>
-      <p:par>
-        <p:cTn id="1" dur="indefinite" restart="never" nodeType="tmRoot"/>
-      </p:par>
-    </p:tnLst>
-  </p:timing>
 </p:sld>
 </file>
 
@@ -17022,13 +16504,6 @@
   <p:clrMapOvr>
     <a:masterClrMapping/>
   </p:clrMapOvr>
-  <p:timing>
-    <p:tnLst>
-      <p:par>
-        <p:cTn id="1" dur="indefinite" restart="never" nodeType="tmRoot"/>
-      </p:par>
-    </p:tnLst>
-  </p:timing>
 </p:sld>
 </file>
 
@@ -17185,13 +16660,6 @@
   <p:clrMapOvr>
     <a:masterClrMapping/>
   </p:clrMapOvr>
-  <p:timing>
-    <p:tnLst>
-      <p:par>
-        <p:cTn id="1" dur="indefinite" restart="never" nodeType="tmRoot"/>
-      </p:par>
-    </p:tnLst>
-  </p:timing>
 </p:sld>
 </file>
 
@@ -17287,13 +16755,6 @@
   <p:clrMapOvr>
     <a:masterClrMapping/>
   </p:clrMapOvr>
-  <p:timing>
-    <p:tnLst>
-      <p:par>
-        <p:cTn id="1" dur="indefinite" restart="never" nodeType="tmRoot"/>
-      </p:par>
-    </p:tnLst>
-  </p:timing>
 </p:sld>
 </file>
 
@@ -17367,32 +16828,14 @@
           <a:p>
             <a:r>
               <a:rPr lang="en-US" dirty="0"/>
-              <a:t>Then use the code as an example to answer the Map quiz </a:t>
-            </a:r>
-            <a:r>
-              <a:rPr lang="en-US" dirty="0" smtClean="0"/>
-              <a:t>questions </a:t>
-            </a:r>
-            <a:r>
-              <a:rPr lang="en-US" dirty="0"/>
-              <a:t>(on Moodle</a:t>
-            </a:r>
-            <a:r>
-              <a:rPr lang="en-US" dirty="0" smtClean="0"/>
-              <a:t>)</a:t>
-            </a:r>
-            <a:endParaRPr lang="en-US" dirty="0"/>
-          </a:p>
-          <a:p>
-            <a:r>
-              <a:rPr lang="en-US" dirty="0"/>
-              <a:t>Then solve the map problems in today’s </a:t>
-            </a:r>
-            <a:r>
-              <a:rPr lang="en-US" dirty="0" smtClean="0"/>
-              <a:t>code</a:t>
-            </a:r>
-            <a:endParaRPr lang="en-US" dirty="0"/>
+              <a:t>Then use the code as an example to answer the Map quiz questions (on Moodle)</a:t>
+            </a:r>
+          </a:p>
+          <a:p>
+            <a:r>
+              <a:rPr lang="en-US" dirty="0"/>
+              <a:t>Then solve the map problems in today’s code</a:t>
+            </a:r>
           </a:p>
         </p:txBody>
       </p:sp>
@@ -17406,21 +16849,6 @@
   <p:clrMapOvr>
     <a:masterClrMapping/>
   </p:clrMapOvr>
-  <mc:AlternateContent xmlns:mc="http://schemas.openxmlformats.org/markup-compatibility/2006">
-    <mc:Choice xmlns:p14="http://schemas.microsoft.com/office/powerpoint/2010/main" Requires="p14">
-      <p:transition spd="slow" p14:dur="2000"/>
-    </mc:Choice>
-    <mc:Fallback>
-      <p:transition spd="slow"/>
-    </mc:Fallback>
-  </mc:AlternateContent>
-  <p:timing>
-    <p:tnLst>
-      <p:par>
-        <p:cTn id="1" dur="indefinite" restart="never" nodeType="tmRoot"/>
-      </p:par>
-    </p:tnLst>
-  </p:timing>
 </p:sld>
 </file>
 
@@ -17481,28 +16909,8 @@
           <a:lstStyle/>
           <a:p>
             <a:r>
-              <a:rPr lang="en-US" dirty="0" smtClean="0"/>
-              <a:t>Read </a:t>
-            </a:r>
-            <a:r>
-              <a:rPr lang="en-US" dirty="0"/>
-              <a:t>through the 3 Map sample problems </a:t>
-            </a:r>
-            <a:r>
-              <a:rPr lang="en-US" dirty="0" smtClean="0"/>
-              <a:t>and </a:t>
-            </a:r>
-            <a:r>
-              <a:rPr lang="en-US" dirty="0"/>
-              <a:t>make sure you </a:t>
-            </a:r>
-            <a:r>
-              <a:rPr lang="en-US" dirty="0" smtClean="0"/>
-              <a:t>understand </a:t>
-            </a:r>
-            <a:r>
-              <a:rPr lang="en-US" dirty="0"/>
-              <a:t>how they work</a:t>
+              <a:rPr lang="en-US" dirty="0"/>
+              <a:t>Read through the 3 Map sample problems and make sure you understand how they work</a:t>
             </a:r>
           </a:p>
           <a:p>
@@ -17549,13 +16957,6 @@
   <p:clrMapOvr>
     <a:masterClrMapping/>
   </p:clrMapOvr>
-  <p:timing>
-    <p:tnLst>
-      <p:par>
-        <p:cTn id="1" dur="indefinite" restart="never" nodeType="tmRoot"/>
-      </p:par>
-    </p:tnLst>
-  </p:timing>
 </p:sld>
 </file>
 
@@ -17599,10 +17000,9 @@
           <a:lstStyle/>
           <a:p>
             <a:r>
-              <a:rPr lang="en-US" dirty="0" smtClean="0"/>
+              <a:rPr lang="en-US" dirty="0"/>
               <a:t>Screenshots</a:t>
             </a:r>
-            <a:endParaRPr lang="en-US" dirty="0"/>
           </a:p>
         </p:txBody>
       </p:sp>
@@ -17961,21 +17361,6 @@
   <p:clrMapOvr>
     <a:masterClrMapping/>
   </p:clrMapOvr>
-  <mc:AlternateContent xmlns:mc="http://schemas.openxmlformats.org/markup-compatibility/2006">
-    <mc:Choice xmlns:p14="http://schemas.microsoft.com/office/powerpoint/2010/main" Requires="p14">
-      <p:transition spd="slow" p14:dur="2000"/>
-    </mc:Choice>
-    <mc:Fallback>
-      <p:transition spd="slow"/>
-    </mc:Fallback>
-  </mc:AlternateContent>
-  <p:timing>
-    <p:tnLst>
-      <p:par>
-        <p:cTn id="1" dur="indefinite" restart="never" nodeType="tmRoot"/>
-      </p:par>
-    </p:tnLst>
-  </p:timing>
 </p:sld>
 </file>
 
@@ -18014,14 +17399,13 @@
           <a:lstStyle/>
           <a:p>
             <a:r>
-              <a:rPr lang="en-US" dirty="0" err="1" smtClean="0"/>
+              <a:rPr lang="en-US" dirty="0" err="1"/>
               <a:t>HashMap</a:t>
             </a:r>
             <a:r>
-              <a:rPr lang="en-US" dirty="0" smtClean="0"/>
+              <a:rPr lang="en-US" dirty="0"/>
               <a:t> with collections  as values</a:t>
             </a:r>
-            <a:endParaRPr lang="en-US" dirty="0"/>
           </a:p>
         </p:txBody>
       </p:sp>
@@ -18051,7 +17435,7 @@
               <a:buNone/>
             </a:pPr>
             <a:r>
-              <a:rPr lang="en-US" dirty="0" smtClean="0"/>
+              <a:rPr lang="en-US" dirty="0"/>
               <a:t>What if we wanted to make a mini-social network…</a:t>
             </a:r>
           </a:p>
@@ -18060,7 +17444,7 @@
               <a:buNone/>
             </a:pPr>
             <a:r>
-              <a:rPr lang="en-US" dirty="0" smtClean="0"/>
+              <a:rPr lang="en-US" dirty="0"/>
               <a:t>Keep track of each student’s (username) friend list?</a:t>
             </a:r>
           </a:p>
@@ -18069,39 +17453,38 @@
               <a:buNone/>
             </a:pPr>
             <a:r>
-              <a:rPr lang="en-US" dirty="0" smtClean="0"/>
+              <a:rPr lang="en-US" dirty="0"/>
               <a:t>How could we store that information?</a:t>
             </a:r>
           </a:p>
           <a:p>
-            <a:endParaRPr lang="en-US" dirty="0" smtClean="0"/>
-          </a:p>
-          <a:p>
-            <a:r>
-              <a:rPr lang="en-US" dirty="0" err="1" smtClean="0"/>
+            <a:endParaRPr lang="en-US" dirty="0"/>
+          </a:p>
+          <a:p>
+            <a:r>
+              <a:rPr lang="en-US" dirty="0" err="1"/>
               <a:t>HashMap</a:t>
             </a:r>
             <a:r>
-              <a:rPr lang="en-US" dirty="0" smtClean="0"/>
+              <a:rPr lang="en-US" dirty="0"/>
               <a:t>?</a:t>
             </a:r>
           </a:p>
           <a:p>
             <a:r>
-              <a:rPr lang="en-US" dirty="0" smtClean="0"/>
+              <a:rPr lang="en-US" dirty="0"/>
               <a:t>Type of key?</a:t>
             </a:r>
           </a:p>
           <a:p>
             <a:r>
-              <a:rPr lang="en-US" dirty="0" smtClean="0"/>
+              <a:rPr lang="en-US" dirty="0"/>
               <a:t>Type of value?</a:t>
             </a:r>
-            <a:endParaRPr lang="en-US" dirty="0"/>
-          </a:p>
-          <a:p>
-            <a:r>
-              <a:rPr lang="en-US" dirty="0" smtClean="0"/>
+          </a:p>
+          <a:p>
+            <a:r>
+              <a:rPr lang="en-US" dirty="0"/>
               <a:t>Code?</a:t>
             </a:r>
           </a:p>
@@ -18109,7 +17492,7 @@
             <a:pPr marL="0" indent="0">
               <a:buNone/>
             </a:pPr>
-            <a:endParaRPr lang="en-US" sz="2000" dirty="0" smtClean="0">
+            <a:endParaRPr lang="en-US" sz="2000" dirty="0">
               <a:latin typeface="Consolas" panose="020B0609020204030204" pitchFamily="49" charset="0"/>
             </a:endParaRPr>
           </a:p>
@@ -18420,10 +17803,9 @@
                     <a:lstStyle/>
                     <a:p>
                       <a:r>
-                        <a:rPr lang="en-US" dirty="0" smtClean="0"/>
+                        <a:rPr lang="en-US" dirty="0"/>
                         <a:t>Keys  (String)</a:t>
                       </a:r>
-                      <a:endParaRPr lang="en-US" dirty="0"/>
                     </a:p>
                   </a:txBody>
                   <a:tcPr/>
@@ -18434,19 +17816,19 @@
                     <a:lstStyle/>
                     <a:p>
                       <a:r>
-                        <a:rPr lang="en-US" dirty="0" smtClean="0"/>
+                        <a:rPr lang="en-US" dirty="0"/>
                         <a:t>Values  (</a:t>
                       </a:r>
                       <a:r>
-                        <a:rPr lang="en-US" dirty="0" err="1" smtClean="0"/>
+                        <a:rPr lang="en-US" dirty="0" err="1"/>
                         <a:t>ArrayList</a:t>
                       </a:r>
                       <a:r>
-                        <a:rPr lang="en-US" dirty="0" smtClean="0"/>
+                        <a:rPr lang="en-US" dirty="0"/>
                         <a:t>&lt;String&gt;</a:t>
                       </a:r>
                       <a:r>
-                        <a:rPr lang="en-US" baseline="0" dirty="0" smtClean="0"/>
+                        <a:rPr lang="en-US" baseline="0" dirty="0"/>
                         <a:t> )</a:t>
                       </a:r>
                       <a:endParaRPr lang="en-US" dirty="0"/>
@@ -18563,14 +17945,13 @@
           <a:lstStyle/>
           <a:p>
             <a:r>
-              <a:rPr lang="en-US" dirty="0" err="1" smtClean="0"/>
+              <a:rPr lang="en-US" dirty="0" err="1"/>
               <a:t>HashMap</a:t>
             </a:r>
             <a:r>
-              <a:rPr lang="en-US" dirty="0" smtClean="0"/>
+              <a:rPr lang="en-US" dirty="0"/>
               <a:t> with collections  as values</a:t>
             </a:r>
-            <a:endParaRPr lang="en-US" dirty="0"/>
           </a:p>
         </p:txBody>
       </p:sp>
@@ -18624,20 +18005,17 @@
               <a:t>&lt;String&gt;&gt; </a:t>
             </a:r>
             <a:r>
-              <a:rPr lang="en-US" sz="2400" dirty="0" err="1" smtClean="0">
+              <a:rPr lang="en-US" sz="2400" dirty="0" err="1">
                 <a:latin typeface="Consolas" panose="020B0609020204030204" pitchFamily="49" charset="0"/>
               </a:rPr>
               <a:t>friendMap</a:t>
             </a:r>
             <a:r>
-              <a:rPr lang="en-US" sz="2400" dirty="0" smtClean="0">
+              <a:rPr lang="en-US" sz="2400" dirty="0">
                 <a:latin typeface="Consolas" panose="020B0609020204030204" pitchFamily="49" charset="0"/>
               </a:rPr>
               <a:t>;</a:t>
             </a:r>
-            <a:endParaRPr lang="en-US" sz="2400" dirty="0">
-              <a:latin typeface="Consolas" panose="020B0609020204030204" pitchFamily="49" charset="0"/>
-            </a:endParaRPr>
           </a:p>
           <a:p>
             <a:pPr marL="0" indent="0">
@@ -18720,9 +18098,6 @@
               </a:rPr>
               <a:t>&gt;();</a:t>
             </a:r>
-            <a:endParaRPr lang="en-US" sz="2400" dirty="0">
-              <a:latin typeface="Consolas" panose="020B0609020204030204" pitchFamily="49" charset="0"/>
-            </a:endParaRPr>
           </a:p>
           <a:p>
             <a:pPr marL="0" indent="0">
@@ -18758,40 +18133,28 @@
               <a:buNone/>
             </a:pPr>
             <a:r>
-              <a:rPr lang="en-US" sz="2400" dirty="0" err="1" smtClean="0">
+              <a:rPr lang="en-US" sz="2400" dirty="0" err="1">
                 <a:latin typeface="Consolas" panose="020B0609020204030204" pitchFamily="49" charset="0"/>
               </a:rPr>
               <a:t>ArrayList</a:t>
             </a:r>
             <a:r>
-              <a:rPr lang="en-US" sz="2400" dirty="0" smtClean="0">
-                <a:latin typeface="Consolas" panose="020B0609020204030204" pitchFamily="49" charset="0"/>
-              </a:rPr>
-              <a:t>&lt;String</a:t>
-            </a:r>
-            <a:r>
               <a:rPr lang="en-US" sz="2400" dirty="0">
                 <a:latin typeface="Consolas" panose="020B0609020204030204" pitchFamily="49" charset="0"/>
               </a:rPr>
-              <a:t>&gt; </a:t>
-            </a:r>
-            <a:r>
-              <a:rPr lang="en-US" sz="2400" dirty="0" err="1" smtClean="0">
+              <a:t>&lt;String&gt; </a:t>
+            </a:r>
+            <a:r>
+              <a:rPr lang="en-US" sz="2400" dirty="0" err="1">
                 <a:latin typeface="Consolas" panose="020B0609020204030204" pitchFamily="49" charset="0"/>
               </a:rPr>
               <a:t>jasonsFriends</a:t>
             </a:r>
             <a:r>
-              <a:rPr lang="en-US" sz="2400" dirty="0" smtClean="0">
-                <a:latin typeface="Consolas" panose="020B0609020204030204" pitchFamily="49" charset="0"/>
-              </a:rPr>
-              <a:t> </a:t>
-            </a:r>
-            <a:r>
               <a:rPr lang="en-US" sz="2400" dirty="0">
                 <a:latin typeface="Consolas" panose="020B0609020204030204" pitchFamily="49" charset="0"/>
               </a:rPr>
-              <a:t>= </a:t>
+              <a:t> = </a:t>
             </a:r>
             <a:r>
               <a:rPr lang="en-US" sz="2400" dirty="0" err="1">
@@ -18811,7 +18174,7 @@
               <a:buNone/>
             </a:pPr>
             <a:r>
-              <a:rPr lang="en-US" sz="2400" dirty="0" err="1" smtClean="0">
+              <a:rPr lang="en-US" sz="2400" dirty="0" err="1">
                 <a:latin typeface="Consolas" panose="020B0609020204030204" pitchFamily="49" charset="0"/>
               </a:rPr>
               <a:t>jasonsFriends.add</a:t>
@@ -18828,7 +18191,7 @@
               <a:buNone/>
             </a:pPr>
             <a:r>
-              <a:rPr lang="en-US" sz="2400" dirty="0" err="1" smtClean="0">
+              <a:rPr lang="en-US" sz="2400" dirty="0" err="1">
                 <a:latin typeface="Consolas" panose="020B0609020204030204" pitchFamily="49" charset="0"/>
               </a:rPr>
               <a:t>friendMap.get</a:t>
@@ -18845,7 +18208,7 @@
               <a:buNone/>
             </a:pPr>
             <a:r>
-              <a:rPr lang="en-US" sz="2400" dirty="0" err="1" smtClean="0">
+              <a:rPr lang="en-US" sz="2400" dirty="0" err="1">
                 <a:latin typeface="Consolas" panose="020B0609020204030204" pitchFamily="49" charset="0"/>
               </a:rPr>
               <a:t>friendMap.get</a:t>
@@ -18861,7 +18224,7 @@
             <a:pPr marL="0" indent="0">
               <a:buNone/>
             </a:pPr>
-            <a:endParaRPr lang="en-US" sz="2400" dirty="0" smtClean="0">
+            <a:endParaRPr lang="en-US" sz="2400" dirty="0">
               <a:latin typeface="Consolas" panose="020B0609020204030204" pitchFamily="49" charset="0"/>
             </a:endParaRPr>
           </a:p>
@@ -18869,7 +18232,7 @@
             <a:pPr marL="0" indent="0">
               <a:buNone/>
             </a:pPr>
-            <a:endParaRPr lang="en-US" sz="2400" dirty="0" smtClean="0">
+            <a:endParaRPr lang="en-US" sz="2400" dirty="0">
               <a:latin typeface="Consolas" panose="020B0609020204030204" pitchFamily="49" charset="0"/>
             </a:endParaRPr>
           </a:p>
@@ -18916,10 +18279,9 @@
                     <a:lstStyle/>
                     <a:p>
                       <a:r>
-                        <a:rPr lang="en-US" dirty="0" smtClean="0"/>
+                        <a:rPr lang="en-US" dirty="0"/>
                         <a:t>Keys  (String)</a:t>
                       </a:r>
-                      <a:endParaRPr lang="en-US" dirty="0"/>
                     </a:p>
                   </a:txBody>
                   <a:tcPr/>
@@ -18930,19 +18292,19 @@
                     <a:lstStyle/>
                     <a:p>
                       <a:r>
-                        <a:rPr lang="en-US" dirty="0" smtClean="0"/>
+                        <a:rPr lang="en-US" dirty="0"/>
                         <a:t>Values  (</a:t>
                       </a:r>
                       <a:r>
-                        <a:rPr lang="en-US" dirty="0" err="1" smtClean="0"/>
+                        <a:rPr lang="en-US" dirty="0" err="1"/>
                         <a:t>ArrayList</a:t>
                       </a:r>
                       <a:r>
-                        <a:rPr lang="en-US" dirty="0" smtClean="0"/>
+                        <a:rPr lang="en-US" dirty="0"/>
                         <a:t>&lt;String&gt;</a:t>
                       </a:r>
                       <a:r>
-                        <a:rPr lang="en-US" baseline="0" dirty="0" smtClean="0"/>
+                        <a:rPr lang="en-US" baseline="0" dirty="0"/>
                         <a:t> )</a:t>
                       </a:r>
                       <a:endParaRPr lang="en-US" dirty="0"/>
@@ -18963,10 +18325,9 @@
                     <a:lstStyle/>
                     <a:p>
                       <a:r>
-                        <a:rPr lang="en-US" dirty="0" smtClean="0"/>
+                        <a:rPr lang="en-US" dirty="0"/>
                         <a:t>Jason</a:t>
                       </a:r>
-                      <a:endParaRPr lang="en-US" dirty="0"/>
                     </a:p>
                   </a:txBody>
                   <a:tcPr/>
@@ -18977,10 +18338,9 @@
                     <a:lstStyle/>
                     <a:p>
                       <a:r>
-                        <a:rPr lang="en-US" dirty="0" smtClean="0"/>
+                        <a:rPr lang="en-US" dirty="0"/>
                         <a:t>[]</a:t>
                       </a:r>
-                      <a:endParaRPr lang="en-US" dirty="0"/>
                     </a:p>
                   </a:txBody>
                   <a:tcPr/>
@@ -19117,18 +18477,17 @@
           <a:lstStyle/>
           <a:p>
             <a:r>
-              <a:rPr lang="en-US" dirty="0" smtClean="0"/>
+              <a:rPr lang="en-US" dirty="0"/>
               <a:t>NULL POINTER EXCEPTION: </a:t>
             </a:r>
             <a:r>
-              <a:rPr lang="en-US" dirty="0" err="1" smtClean="0"/>
+              <a:rPr lang="en-US" dirty="0" err="1"/>
               <a:t>friendMap</a:t>
             </a:r>
             <a:r>
-              <a:rPr lang="en-US" dirty="0" smtClean="0"/>
+              <a:rPr lang="en-US" dirty="0"/>
               <a:t> is null</a:t>
             </a:r>
-            <a:endParaRPr lang="en-US" dirty="0"/>
           </a:p>
         </p:txBody>
       </p:sp>
@@ -19200,7 +18559,7 @@
           <a:lstStyle/>
           <a:p>
             <a:r>
-              <a:rPr lang="en-US" dirty="0" smtClean="0"/>
+              <a:rPr lang="en-US" dirty="0"/>
               <a:t>NULL POINTER EXCEPTION: </a:t>
             </a:r>
             <a:r>
@@ -19216,10 +18575,9 @@
               <a:t>("JP")</a:t>
             </a:r>
             <a:r>
-              <a:rPr lang="en-US" dirty="0" smtClean="0"/>
+              <a:rPr lang="en-US" dirty="0"/>
               <a:t> is null</a:t>
             </a:r>
-            <a:endParaRPr lang="en-US" dirty="0"/>
           </a:p>
         </p:txBody>
       </p:sp>
@@ -19304,10 +18662,9 @@
                     <a:lstStyle/>
                     <a:p>
                       <a:r>
-                        <a:rPr lang="en-US" dirty="0" smtClean="0"/>
+                        <a:rPr lang="en-US" dirty="0"/>
                         <a:t>Keys  (String)</a:t>
                       </a:r>
-                      <a:endParaRPr lang="en-US" dirty="0"/>
                     </a:p>
                   </a:txBody>
                   <a:tcPr/>
@@ -19318,19 +18675,19 @@
                     <a:lstStyle/>
                     <a:p>
                       <a:r>
-                        <a:rPr lang="en-US" dirty="0" smtClean="0"/>
+                        <a:rPr lang="en-US" dirty="0"/>
                         <a:t>Values  (</a:t>
                       </a:r>
                       <a:r>
-                        <a:rPr lang="en-US" dirty="0" err="1" smtClean="0"/>
+                        <a:rPr lang="en-US" dirty="0" err="1"/>
                         <a:t>ArrayList</a:t>
                       </a:r>
                       <a:r>
-                        <a:rPr lang="en-US" dirty="0" smtClean="0"/>
+                        <a:rPr lang="en-US" dirty="0"/>
                         <a:t>&lt;String&gt;</a:t>
                       </a:r>
                       <a:r>
-                        <a:rPr lang="en-US" baseline="0" dirty="0" smtClean="0"/>
+                        <a:rPr lang="en-US" baseline="0" dirty="0"/>
                         <a:t> )</a:t>
                       </a:r>
                       <a:endParaRPr lang="en-US" dirty="0"/>
@@ -19351,10 +18708,9 @@
                     <a:lstStyle/>
                     <a:p>
                       <a:r>
-                        <a:rPr lang="en-US" dirty="0" smtClean="0"/>
+                        <a:rPr lang="en-US" dirty="0"/>
                         <a:t>Jason</a:t>
                       </a:r>
-                      <a:endParaRPr lang="en-US" dirty="0"/>
                     </a:p>
                   </a:txBody>
                   <a:tcPr/>
@@ -19365,10 +18721,9 @@
                     <a:lstStyle/>
                     <a:p>
                       <a:r>
-                        <a:rPr lang="en-US" dirty="0" smtClean="0"/>
+                        <a:rPr lang="en-US" dirty="0"/>
                         <a:t>[Aaron]</a:t>
                       </a:r>
-                      <a:endParaRPr lang="en-US" dirty="0"/>
                     </a:p>
                   </a:txBody>
                   <a:tcPr/>
@@ -19478,10 +18833,9 @@
                     <a:lstStyle/>
                     <a:p>
                       <a:r>
-                        <a:rPr lang="en-US" dirty="0" smtClean="0"/>
+                        <a:rPr lang="en-US" dirty="0"/>
                         <a:t>Keys  (String)</a:t>
                       </a:r>
-                      <a:endParaRPr lang="en-US" dirty="0"/>
                     </a:p>
                   </a:txBody>
                   <a:tcPr/>
@@ -19492,19 +18846,19 @@
                     <a:lstStyle/>
                     <a:p>
                       <a:r>
-                        <a:rPr lang="en-US" dirty="0" smtClean="0"/>
+                        <a:rPr lang="en-US" dirty="0"/>
                         <a:t>Values  (</a:t>
                       </a:r>
                       <a:r>
-                        <a:rPr lang="en-US" dirty="0" err="1" smtClean="0"/>
+                        <a:rPr lang="en-US" dirty="0" err="1"/>
                         <a:t>ArrayList</a:t>
                       </a:r>
                       <a:r>
-                        <a:rPr lang="en-US" dirty="0" smtClean="0"/>
+                        <a:rPr lang="en-US" dirty="0"/>
                         <a:t>&lt;String&gt;</a:t>
                       </a:r>
                       <a:r>
-                        <a:rPr lang="en-US" baseline="0" dirty="0" smtClean="0"/>
+                        <a:rPr lang="en-US" baseline="0" dirty="0"/>
                         <a:t> )</a:t>
                       </a:r>
                       <a:endParaRPr lang="en-US" dirty="0"/>
@@ -19525,10 +18879,9 @@
                     <a:lstStyle/>
                     <a:p>
                       <a:r>
-                        <a:rPr lang="en-US" dirty="0" smtClean="0"/>
+                        <a:rPr lang="en-US" dirty="0"/>
                         <a:t>Jason</a:t>
                       </a:r>
-                      <a:endParaRPr lang="en-US" dirty="0"/>
                     </a:p>
                   </a:txBody>
                   <a:tcPr/>
@@ -19539,10 +18892,9 @@
                     <a:lstStyle/>
                     <a:p>
                       <a:r>
-                        <a:rPr lang="en-US" dirty="0" smtClean="0"/>
+                        <a:rPr lang="en-US" dirty="0"/>
                         <a:t>[Aaron, JP]</a:t>
                       </a:r>
-                      <a:endParaRPr lang="en-US" dirty="0"/>
                     </a:p>
                   </a:txBody>
                   <a:tcPr/>
@@ -20438,10 +19790,9 @@
           <a:lstStyle/>
           <a:p>
             <a:r>
-              <a:rPr lang="en-US" dirty="0" smtClean="0"/>
+              <a:rPr lang="en-US" dirty="0"/>
               <a:t>Reminder: Questions from Today</a:t>
             </a:r>
-            <a:endParaRPr lang="en-US" dirty="0"/>
           </a:p>
         </p:txBody>
       </p:sp>
@@ -20494,13 +19845,6 @@
   <p:clrMapOvr>
     <a:masterClrMapping/>
   </p:clrMapOvr>
-  <p:timing>
-    <p:tnLst>
-      <p:par>
-        <p:cTn id="1" dur="indefinite" restart="never" nodeType="tmRoot"/>
-      </p:par>
-    </p:tnLst>
-  </p:timing>
 </p:sld>
 </file>
 
@@ -20562,21 +19906,13 @@
           <a:p>
             <a:r>
               <a:rPr lang="en-US" dirty="0"/>
-              <a:t>Questions: Post to </a:t>
-            </a:r>
-            <a:r>
-              <a:rPr lang="en-US" dirty="0" smtClean="0"/>
-              <a:t>Piazza</a:t>
-            </a:r>
-          </a:p>
-          <a:p>
-            <a:r>
-              <a:rPr lang="en-US" dirty="0" smtClean="0"/>
-              <a:t>Academic </a:t>
-            </a:r>
-            <a:r>
-              <a:rPr lang="en-US" dirty="0"/>
-              <a:t>Honesty</a:t>
+              <a:t>Questions: Post to Piazza</a:t>
+            </a:r>
+          </a:p>
+          <a:p>
+            <a:r>
+              <a:rPr lang="en-US" dirty="0"/>
+              <a:t>Academic Honesty</a:t>
             </a:r>
           </a:p>
           <a:p>
@@ -20587,18 +19923,18 @@
           </a:p>
           <a:p>
             <a:r>
-              <a:rPr lang="en-US" dirty="0" smtClean="0"/>
+              <a:rPr lang="en-US" dirty="0"/>
               <a:t>Review:</a:t>
             </a:r>
           </a:p>
           <a:p>
             <a:pPr lvl="1"/>
             <a:r>
-              <a:rPr lang="en-US" dirty="0" smtClean="0"/>
+              <a:rPr lang="en-US" dirty="0"/>
               <a:t>Coding </a:t>
             </a:r>
             <a:r>
-              <a:rPr lang="en-US" dirty="0" err="1" smtClean="0"/>
+              <a:rPr lang="en-US" dirty="0" err="1"/>
               <a:t>Gotchas</a:t>
             </a:r>
             <a:endParaRPr lang="en-US" dirty="0"/>
@@ -20634,13 +19970,6 @@
   <p:clrMapOvr>
     <a:masterClrMapping/>
   </p:clrMapOvr>
-  <p:timing>
-    <p:tnLst>
-      <p:par>
-        <p:cTn id="1" dur="indefinite" restart="never" nodeType="tmRoot"/>
-      </p:par>
-    </p:tnLst>
-  </p:timing>
 </p:sld>
 </file>
 
@@ -20682,10 +20011,9 @@
           <a:lstStyle/>
           <a:p>
             <a:r>
-              <a:rPr lang="en-US" dirty="0" smtClean="0"/>
+              <a:rPr lang="en-US" dirty="0"/>
               <a:t>Questions: Post to Piazza</a:t>
             </a:r>
-            <a:endParaRPr lang="en-US" dirty="0"/>
           </a:p>
         </p:txBody>
       </p:sp>
@@ -20712,11 +20040,11 @@
           <a:lstStyle/>
           <a:p>
             <a:r>
-              <a:rPr lang="en-US" dirty="0" smtClean="0"/>
+              <a:rPr lang="en-US" dirty="0"/>
               <a:t>PLEASE </a:t>
             </a:r>
             <a:r>
-              <a:rPr lang="en-US" u="sng" dirty="0" smtClean="0"/>
+              <a:rPr lang="en-US" u="sng" dirty="0"/>
               <a:t>Post All Questions to Piazza</a:t>
             </a:r>
           </a:p>
@@ -20760,7 +20088,7 @@
           </a:p>
           <a:p>
             <a:pPr lvl="1"/>
-            <a:endParaRPr lang="en-US" dirty="0" smtClean="0"/>
+            <a:endParaRPr lang="en-US" dirty="0"/>
           </a:p>
           <a:p>
             <a:pPr lvl="1"/>
@@ -20768,48 +20096,39 @@
           </a:p>
           <a:p>
             <a:pPr lvl="1"/>
-            <a:endParaRPr lang="en-US" dirty="0" smtClean="0"/>
-          </a:p>
-          <a:p>
-            <a:pPr lvl="1"/>
-            <a:endParaRPr lang="en-US" dirty="0" smtClean="0"/>
+            <a:endParaRPr lang="en-US" dirty="0"/>
           </a:p>
           <a:p>
             <a:pPr lvl="1"/>
             <a:endParaRPr lang="en-US" dirty="0"/>
           </a:p>
           <a:p>
-            <a:r>
-              <a:rPr lang="en-US" dirty="0" smtClean="0"/>
+            <a:pPr lvl="1"/>
+            <a:endParaRPr lang="en-US" dirty="0"/>
+          </a:p>
+          <a:p>
+            <a:r>
+              <a:rPr lang="en-US" dirty="0"/>
               <a:t>Otherwise: please post questions and look to help </a:t>
             </a:r>
             <a:r>
-              <a:rPr lang="en-US" i="1" u="sng" dirty="0" smtClean="0"/>
+              <a:rPr lang="en-US" i="1" u="sng" dirty="0"/>
               <a:t>provide hints</a:t>
             </a:r>
             <a:r>
-              <a:rPr lang="en-US" i="1" dirty="0" smtClean="0"/>
+              <a:rPr lang="en-US" i="1" dirty="0"/>
               <a:t> </a:t>
             </a:r>
             <a:r>
-              <a:rPr lang="en-US" dirty="0" smtClean="0"/>
+              <a:rPr lang="en-US" dirty="0"/>
               <a:t>to other students </a:t>
             </a:r>
           </a:p>
           <a:p>
             <a:r>
-              <a:rPr lang="en-US" dirty="0" smtClean="0"/>
-              <a:t>Collaborative (i.e. </a:t>
-            </a:r>
-            <a:r>
-              <a:rPr lang="en-US" dirty="0" smtClean="0"/>
-              <a:t>in-class activities)</a:t>
-            </a:r>
-            <a:r>
-              <a:rPr lang="en-US" dirty="0" smtClean="0"/>
-              <a:t> or if you don’t have to post code to ask the question</a:t>
-            </a:r>
-            <a:endParaRPr lang="en-US" dirty="0"/>
+              <a:rPr lang="en-US" dirty="0"/>
+              <a:t>Collaborative (i.e. in-class activities) or if you don’t have to post code to ask the question</a:t>
+            </a:r>
           </a:p>
         </p:txBody>
       </p:sp>
@@ -20928,13 +20247,6 @@
   <p:clrMapOvr>
     <a:masterClrMapping/>
   </p:clrMapOvr>
-  <p:timing>
-    <p:tnLst>
-      <p:par>
-        <p:cTn id="1" dur="indefinite" restart="never" nodeType="tmRoot"/>
-      </p:par>
-    </p:tnLst>
-  </p:timing>
 </p:sld>
 </file>
 
@@ -20971,10 +20283,9 @@
           <a:lstStyle/>
           <a:p>
             <a:r>
-              <a:rPr lang="en-US" dirty="0" smtClean="0"/>
+              <a:rPr lang="en-US" dirty="0"/>
               <a:t>Quizzes</a:t>
             </a:r>
-            <a:endParaRPr lang="en-US" dirty="0"/>
           </a:p>
         </p:txBody>
       </p:sp>
@@ -20994,28 +20305,27 @@
           <a:lstStyle/>
           <a:p>
             <a:r>
-              <a:rPr lang="en-US" dirty="0" smtClean="0"/>
+              <a:rPr lang="en-US" dirty="0"/>
               <a:t>There will be an online quiz associated with almost every lecture</a:t>
             </a:r>
           </a:p>
           <a:p>
             <a:r>
-              <a:rPr lang="en-US" dirty="0" smtClean="0"/>
+              <a:rPr lang="en-US" dirty="0"/>
               <a:t>Available on Moodle</a:t>
             </a:r>
           </a:p>
           <a:p>
             <a:r>
-              <a:rPr lang="en-US" dirty="0" smtClean="0"/>
+              <a:rPr lang="en-US" dirty="0"/>
               <a:t>Must be completed by 11:55pm EST on the day of the lecture</a:t>
             </a:r>
           </a:p>
           <a:p>
             <a:r>
-              <a:rPr lang="en-US" dirty="0" smtClean="0"/>
+              <a:rPr lang="en-US" dirty="0"/>
               <a:t>You can post questions relating to this on Moodle even sharing your code</a:t>
             </a:r>
-            <a:endParaRPr lang="en-US" dirty="0"/>
           </a:p>
         </p:txBody>
       </p:sp>
@@ -21029,13 +20339,6 @@
   <p:clrMapOvr>
     <a:masterClrMapping/>
   </p:clrMapOvr>
-  <p:timing>
-    <p:tnLst>
-      <p:par>
-        <p:cTn id="1" dur="indefinite" restart="never" nodeType="tmRoot"/>
-      </p:par>
-    </p:tnLst>
-  </p:timing>
 </p:sld>
 </file>
 
@@ -21358,13 +20661,6 @@
   <p:clrMapOvr>
     <a:masterClrMapping/>
   </p:clrMapOvr>
-  <p:timing>
-    <p:tnLst>
-      <p:par>
-        <p:cTn id="1" dur="indefinite" restart="never" nodeType="tmRoot"/>
-      </p:par>
-    </p:tnLst>
-  </p:timing>
 </p:sld>
 </file>
 

</xml_diff>